<commit_message>
clean up before i make some most interview notes
</commit_message>
<xml_diff>
--- a/presentation v1.pptx
+++ b/presentation v1.pptx
@@ -78,43 +78,7 @@
               <a:rPr b="0" lang="en-AU" sz="4400" spc="-1" strike="noStrike">
                 <a:latin typeface="Arial"/>
               </a:rPr>
-              <a:t>Clic</a:t>
-            </a:r>
-            <a:r>
-              <a:rPr b="0" lang="en-AU" sz="4400" spc="-1" strike="noStrike">
-                <a:latin typeface="Arial"/>
-              </a:rPr>
-              <a:t>k to </a:t>
-            </a:r>
-            <a:r>
-              <a:rPr b="0" lang="en-AU" sz="4400" spc="-1" strike="noStrike">
-                <a:latin typeface="Arial"/>
-              </a:rPr>
-              <a:t>mo</a:t>
-            </a:r>
-            <a:r>
-              <a:rPr b="0" lang="en-AU" sz="4400" spc="-1" strike="noStrike">
-                <a:latin typeface="Arial"/>
-              </a:rPr>
-              <a:t>ve </a:t>
-            </a:r>
-            <a:r>
-              <a:rPr b="0" lang="en-AU" sz="4400" spc="-1" strike="noStrike">
-                <a:latin typeface="Arial"/>
-              </a:rPr>
-              <a:t>the </a:t>
-            </a:r>
-            <a:r>
-              <a:rPr b="0" lang="en-AU" sz="4400" spc="-1" strike="noStrike">
-                <a:latin typeface="Arial"/>
-              </a:rPr>
-              <a:t>slid</a:t>
-            </a:r>
-            <a:r>
-              <a:rPr b="0" lang="en-AU" sz="4400" spc="-1" strike="noStrike">
-                <a:latin typeface="Arial"/>
-              </a:rPr>
-              <a:t>e</a:t>
+              <a:t>Click to move the slide</a:t>
             </a:r>
             <a:endParaRPr b="0" lang="en-AU" sz="4400" spc="-1" strike="noStrike">
               <a:latin typeface="Arial"/>
@@ -154,31 +118,7 @@
               <a:rPr b="0" lang="en-AU" sz="2000" spc="-1" strike="noStrike">
                 <a:latin typeface="Arial"/>
               </a:rPr>
-              <a:t>Click to </a:t>
-            </a:r>
-            <a:r>
-              <a:rPr b="0" lang="en-AU" sz="2000" spc="-1" strike="noStrike">
-                <a:latin typeface="Arial"/>
-              </a:rPr>
-              <a:t>edit </a:t>
-            </a:r>
-            <a:r>
-              <a:rPr b="0" lang="en-AU" sz="2000" spc="-1" strike="noStrike">
-                <a:latin typeface="Arial"/>
-              </a:rPr>
-              <a:t>the </a:t>
-            </a:r>
-            <a:r>
-              <a:rPr b="0" lang="en-AU" sz="2000" spc="-1" strike="noStrike">
-                <a:latin typeface="Arial"/>
-              </a:rPr>
-              <a:t>notes' </a:t>
-            </a:r>
-            <a:r>
-              <a:rPr b="0" lang="en-AU" sz="2000" spc="-1" strike="noStrike">
-                <a:latin typeface="Arial"/>
-              </a:rPr>
-              <a:t>format</a:t>
+              <a:t>Click to edit the notes' format</a:t>
             </a:r>
             <a:endParaRPr b="0" lang="en-AU" sz="2000" spc="-1" strike="noStrike">
               <a:latin typeface="Arial"/>
@@ -363,7 +303,7 @@
             <a:pPr algn="r">
               <a:buNone/>
             </a:pPr>
-            <a:fld id="{059C0D4C-B4CF-46F0-B784-B9B7F35F4D26}" type="slidenum">
+            <a:fld id="{55BB026E-33BB-4D44-B189-C3F5B3C19832}" type="slidenum">
               <a:rPr b="0" lang="en-AU" sz="1400" spc="-1" strike="noStrike">
                 <a:latin typeface="Times New Roman"/>
               </a:rPr>
@@ -400,7 +340,7 @@
       </p:grpSpPr>
       <p:sp>
         <p:nvSpPr>
-          <p:cNvPr id="127" name="PlaceHolder 1"/>
+          <p:cNvPr id="129" name="PlaceHolder 1"/>
           <p:cNvSpPr>
             <a:spLocks noGrp="1"/>
           </p:cNvSpPr>
@@ -411,7 +351,7 @@
         <p:spPr>
           <a:xfrm>
             <a:off x="216360" y="812520"/>
-            <a:ext cx="7126920" cy="4008960"/>
+            <a:ext cx="7126200" cy="4008240"/>
           </a:xfrm>
           <a:prstGeom prst="rect">
             <a:avLst/>
@@ -423,7 +363,7 @@
       </p:sp>
       <p:sp>
         <p:nvSpPr>
-          <p:cNvPr id="128" name="PlaceHolder 2"/>
+          <p:cNvPr id="130" name="PlaceHolder 2"/>
           <p:cNvSpPr>
             <a:spLocks noGrp="1"/>
           </p:cNvSpPr>
@@ -434,7 +374,7 @@
         <p:spPr>
           <a:xfrm>
             <a:off x="756000" y="5078520"/>
-            <a:ext cx="6047640" cy="4811040"/>
+            <a:ext cx="6046920" cy="4810320"/>
           </a:xfrm>
           <a:prstGeom prst="rect">
             <a:avLst/>
@@ -449,6 +389,15 @@
             <a:noAutofit/>
           </a:bodyPr>
           <a:p>
+            <a:pPr marL="216000" indent="-216000">
+              <a:lnSpc>
+                <a:spcPct val="100000"/>
+              </a:lnSpc>
+              <a:buNone/>
+              <a:tabLst>
+                <a:tab algn="l" pos="0"/>
+              </a:tabLst>
+            </a:pPr>
             <a:r>
               <a:rPr b="0" lang="en-AU" sz="1800" spc="-1" strike="noStrike">
                 <a:latin typeface="Arial"/>
@@ -460,11 +409,29 @@
             </a:endParaRPr>
           </a:p>
           <a:p>
+            <a:pPr marL="216000" indent="-216000">
+              <a:lnSpc>
+                <a:spcPct val="100000"/>
+              </a:lnSpc>
+              <a:buNone/>
+              <a:tabLst>
+                <a:tab algn="l" pos="0"/>
+              </a:tabLst>
+            </a:pPr>
             <a:endParaRPr b="0" lang="en-AU" sz="2000" spc="-1" strike="noStrike">
               <a:latin typeface="Arial"/>
             </a:endParaRPr>
           </a:p>
           <a:p>
+            <a:pPr marL="216000" indent="-216000">
+              <a:lnSpc>
+                <a:spcPct val="100000"/>
+              </a:lnSpc>
+              <a:buNone/>
+              <a:tabLst>
+                <a:tab algn="l" pos="0"/>
+              </a:tabLst>
+            </a:pPr>
             <a:r>
               <a:rPr b="0" lang="en-AU" sz="1800" spc="-1" strike="noStrike">
                 <a:latin typeface="Arial"/>
@@ -476,11 +443,29 @@
             </a:endParaRPr>
           </a:p>
           <a:p>
+            <a:pPr marL="216000" indent="-216000">
+              <a:lnSpc>
+                <a:spcPct val="100000"/>
+              </a:lnSpc>
+              <a:buNone/>
+              <a:tabLst>
+                <a:tab algn="l" pos="0"/>
+              </a:tabLst>
+            </a:pPr>
             <a:endParaRPr b="0" lang="en-AU" sz="2000" spc="-1" strike="noStrike">
               <a:latin typeface="Arial"/>
             </a:endParaRPr>
           </a:p>
           <a:p>
+            <a:pPr marL="216000" indent="-216000">
+              <a:lnSpc>
+                <a:spcPct val="100000"/>
+              </a:lnSpc>
+              <a:buNone/>
+              <a:tabLst>
+                <a:tab algn="l" pos="0"/>
+              </a:tabLst>
+            </a:pPr>
             <a:r>
               <a:rPr b="0" lang="en-AU" sz="1800" spc="-1" strike="noStrike">
                 <a:latin typeface="Arial"/>
@@ -492,11 +477,29 @@
             </a:endParaRPr>
           </a:p>
           <a:p>
+            <a:pPr marL="216000" indent="-216000">
+              <a:lnSpc>
+                <a:spcPct val="100000"/>
+              </a:lnSpc>
+              <a:buNone/>
+              <a:tabLst>
+                <a:tab algn="l" pos="0"/>
+              </a:tabLst>
+            </a:pPr>
             <a:endParaRPr b="0" lang="en-AU" sz="1800" spc="-1" strike="noStrike">
               <a:latin typeface="Arial"/>
             </a:endParaRPr>
           </a:p>
           <a:p>
+            <a:pPr marL="216000" indent="-216000">
+              <a:lnSpc>
+                <a:spcPct val="100000"/>
+              </a:lnSpc>
+              <a:buNone/>
+              <a:tabLst>
+                <a:tab algn="l" pos="0"/>
+              </a:tabLst>
+            </a:pPr>
             <a:r>
               <a:rPr b="0" lang="en-AU" sz="1800" spc="-1" strike="noStrike">
                 <a:latin typeface="Arial"/>
@@ -508,11 +511,210 @@
             </a:endParaRPr>
           </a:p>
           <a:p>
+            <a:pPr marL="216000" indent="-216000">
+              <a:lnSpc>
+                <a:spcPct val="100000"/>
+              </a:lnSpc>
+              <a:buNone/>
+              <a:tabLst>
+                <a:tab algn="l" pos="0"/>
+              </a:tabLst>
+            </a:pPr>
             <a:endParaRPr b="0" lang="en-AU" sz="2000" spc="-1" strike="noStrike">
               <a:latin typeface="Arial"/>
             </a:endParaRPr>
           </a:p>
           <a:p>
+            <a:pPr marL="216000" indent="-216000">
+              <a:lnSpc>
+                <a:spcPct val="100000"/>
+              </a:lnSpc>
+              <a:buNone/>
+              <a:tabLst>
+                <a:tab algn="l" pos="0"/>
+              </a:tabLst>
+            </a:pPr>
+            <a:endParaRPr b="0" lang="en-AU" sz="2000" spc="-1" strike="noStrike">
+              <a:latin typeface="Arial"/>
+            </a:endParaRPr>
+          </a:p>
+        </p:txBody>
+      </p:sp>
+    </p:spTree>
+  </p:cSld>
+</p:notes>
+</file>
+
+<file path=ppt/notesSlides/notesSlide2.xml><?xml version="1.0" encoding="utf-8"?>
+<p:notes xmlns:a="http://schemas.openxmlformats.org/drawingml/2006/main" xmlns:p="http://schemas.openxmlformats.org/presentationml/2006/main" xmlns:r="http://schemas.openxmlformats.org/officeDocument/2006/relationships" xmlns:p14="http://schemas.microsoft.com/office/powerpoint/2010/main" xmlns:p15="http://schemas.microsoft.com/office/powerpoint/2012/main" xmlns:mc="http://schemas.openxmlformats.org/markup-compatibility/2006">
+  <p:cSld>
+    <p:spTree>
+      <p:nvGrpSpPr>
+        <p:cNvPr id="1" name=""/>
+        <p:cNvGrpSpPr/>
+        <p:nvPr/>
+      </p:nvGrpSpPr>
+      <p:grpSpPr>
+        <a:xfrm>
+          <a:off x="0" y="0"/>
+          <a:ext cx="0" cy="0"/>
+          <a:chOff x="0" y="0"/>
+          <a:chExt cx="0" cy="0"/>
+        </a:xfrm>
+      </p:grpSpPr>
+      <p:sp>
+        <p:nvSpPr>
+          <p:cNvPr id="115" name="PlaceHolder 1"/>
+          <p:cNvSpPr>
+            <a:spLocks noGrp="1"/>
+          </p:cNvSpPr>
+          <p:nvPr>
+            <p:ph type="sldImg"/>
+          </p:nvPr>
+        </p:nvSpPr>
+        <p:spPr>
+          <a:xfrm>
+            <a:off x="216000" y="812520"/>
+            <a:ext cx="7126920" cy="4008600"/>
+          </a:xfrm>
+          <a:prstGeom prst="rect">
+            <a:avLst/>
+          </a:prstGeom>
+          <a:ln w="0">
+            <a:noFill/>
+          </a:ln>
+        </p:spPr>
+      </p:sp>
+      <p:sp>
+        <p:nvSpPr>
+          <p:cNvPr id="116" name="PlaceHolder 2"/>
+          <p:cNvSpPr>
+            <a:spLocks noGrp="1"/>
+          </p:cNvSpPr>
+          <p:nvPr>
+            <p:ph type="body"/>
+          </p:nvPr>
+        </p:nvSpPr>
+        <p:spPr>
+          <a:xfrm>
+            <a:off x="756000" y="5078520"/>
+            <a:ext cx="6047280" cy="4810680"/>
+          </a:xfrm>
+          <a:prstGeom prst="rect">
+            <a:avLst/>
+          </a:prstGeom>
+          <a:noFill/>
+          <a:ln w="0">
+            <a:noFill/>
+          </a:ln>
+        </p:spPr>
+        <p:txBody>
+          <a:bodyPr lIns="0" rIns="0" tIns="0" bIns="0" anchor="t">
+            <a:noAutofit/>
+          </a:bodyPr>
+          <a:p>
+            <a:pPr marL="216000" indent="-216000">
+              <a:lnSpc>
+                <a:spcPct val="100000"/>
+              </a:lnSpc>
+              <a:buNone/>
+            </a:pPr>
+            <a:r>
+              <a:rPr b="0" lang="en-AU" sz="2000" spc="-1" strike="noStrike">
+                <a:latin typeface="Arial"/>
+              </a:rPr>
+              <a:t>PED measures how the quantity sold of a good changes in response to a change in its price.</a:t>
+            </a:r>
+            <a:endParaRPr b="0" lang="en-AU" sz="2000" spc="-1" strike="noStrike">
+              <a:latin typeface="Arial"/>
+            </a:endParaRPr>
+          </a:p>
+          <a:p>
+            <a:pPr marL="216000" indent="-216000">
+              <a:lnSpc>
+                <a:spcPct val="100000"/>
+              </a:lnSpc>
+              <a:buNone/>
+            </a:pPr>
+            <a:endParaRPr b="0" lang="en-AU" sz="2000" spc="-1" strike="noStrike">
+              <a:latin typeface="Arial"/>
+            </a:endParaRPr>
+          </a:p>
+          <a:p>
+            <a:pPr marL="216000" indent="-216000">
+              <a:lnSpc>
+                <a:spcPct val="100000"/>
+              </a:lnSpc>
+              <a:buNone/>
+            </a:pPr>
+            <a:r>
+              <a:rPr b="0" lang="en-AU" sz="2000" spc="-1" strike="noStrike">
+                <a:latin typeface="Arial"/>
+              </a:rPr>
+              <a:t>PED is generally negatively sloped, so we’d expect to see a decrease in quantity as price increases.</a:t>
+            </a:r>
+            <a:endParaRPr b="0" lang="en-AU" sz="2000" spc="-1" strike="noStrike">
+              <a:latin typeface="Arial"/>
+            </a:endParaRPr>
+          </a:p>
+          <a:p>
+            <a:pPr marL="216000" indent="-216000">
+              <a:lnSpc>
+                <a:spcPct val="100000"/>
+              </a:lnSpc>
+              <a:buNone/>
+            </a:pPr>
+            <a:endParaRPr b="0" lang="en-AU" sz="2000" spc="-1" strike="noStrike">
+              <a:latin typeface="Arial"/>
+            </a:endParaRPr>
+          </a:p>
+          <a:p>
+            <a:pPr marL="216000" indent="-216000">
+              <a:lnSpc>
+                <a:spcPct val="100000"/>
+              </a:lnSpc>
+              <a:buNone/>
+              <a:tabLst>
+                <a:tab algn="l" pos="0"/>
+              </a:tabLst>
+            </a:pPr>
+            <a:r>
+              <a:rPr b="0" lang="en-US" sz="2000" spc="-1" strike="noStrike">
+                <a:solidFill>
+                  <a:srgbClr val="000000"/>
+                </a:solidFill>
+                <a:latin typeface="Arial"/>
+              </a:rPr>
+              <a:t>There are special exceptions to this, such as Giffen goods, but in our case we expect PED to be quite elastic.</a:t>
+            </a:r>
+            <a:endParaRPr b="0" lang="en-AU" sz="2000" spc="-1" strike="noStrike">
+              <a:latin typeface="Arial"/>
+            </a:endParaRPr>
+          </a:p>
+          <a:p>
+            <a:pPr marL="216000" indent="-216000">
+              <a:lnSpc>
+                <a:spcPct val="100000"/>
+              </a:lnSpc>
+              <a:buNone/>
+            </a:pPr>
+            <a:endParaRPr b="0" lang="en-AU" sz="2000" spc="-1" strike="noStrike">
+              <a:latin typeface="Arial"/>
+            </a:endParaRPr>
+          </a:p>
+          <a:p>
+            <a:pPr marL="216000" indent="-216000">
+              <a:lnSpc>
+                <a:spcPct val="100000"/>
+              </a:lnSpc>
+              <a:buNone/>
+            </a:pPr>
+            <a:r>
+              <a:rPr b="0" lang="en-AU" sz="2000" spc="-1" strike="noStrike">
+                <a:latin typeface="Arial"/>
+              </a:rPr>
+              <a:t>This table is important because it establishes a baseline against which we’ll compare our results.</a:t>
+            </a:r>
             <a:endParaRPr b="0" lang="en-AU" sz="2000" spc="-1" strike="noStrike">
               <a:latin typeface="Arial"/>
             </a:endParaRPr>
@@ -543,7 +745,7 @@
       </p:grpSpPr>
       <p:sp>
         <p:nvSpPr>
-          <p:cNvPr id="115" name="PlaceHolder 1"/>
+          <p:cNvPr id="117" name="PlaceHolder 1"/>
           <p:cNvSpPr>
             <a:spLocks noGrp="1"/>
           </p:cNvSpPr>
@@ -554,7 +756,7 @@
         <p:spPr>
           <a:xfrm>
             <a:off x="533520" y="764280"/>
-            <a:ext cx="6703200" cy="3769920"/>
+            <a:ext cx="6702480" cy="3769200"/>
           </a:xfrm>
           <a:prstGeom prst="rect">
             <a:avLst/>
@@ -566,7 +768,7 @@
       </p:sp>
       <p:sp>
         <p:nvSpPr>
-          <p:cNvPr id="116" name="PlaceHolder 2"/>
+          <p:cNvPr id="118" name="PlaceHolder 2"/>
           <p:cNvSpPr>
             <a:spLocks noGrp="1"/>
           </p:cNvSpPr>
@@ -577,7 +779,7 @@
         <p:spPr>
           <a:xfrm>
             <a:off x="360000" y="4777560"/>
-            <a:ext cx="7020000" cy="4524480"/>
+            <a:ext cx="7019280" cy="4523760"/>
           </a:xfrm>
           <a:prstGeom prst="rect">
             <a:avLst/>
@@ -602,22 +804,13 @@
               </a:tabLst>
             </a:pPr>
             <a:r>
-              <a:rPr b="0" lang="en-US" sz="1400" spc="-1" strike="noStrike">
+              <a:rPr b="1" lang="en-US" sz="1400" spc="-1" strike="noStrike">
                 <a:solidFill>
                   <a:srgbClr val="000000"/>
                 </a:solidFill>
                 <a:latin typeface="Arial"/>
               </a:rPr>
-              <a:t>Assumption</a:t>
-            </a:r>
-            <a:r>
-              <a:rPr b="0" lang="en-US" sz="1400" spc="-1" strike="noStrike">
-                <a:solidFill>
-                  <a:srgbClr val="000000"/>
-                </a:solidFill>
-                <a:latin typeface="Arial"/>
-              </a:rPr>
-              <a:t>s</a:t>
+              <a:t>Sam's Pizza is the Only Pizza Seller Available</a:t>
             </a:r>
             <a:endParaRPr b="0" lang="en-AU" sz="1400" spc="-1" strike="noStrike">
               <a:latin typeface="Arial"/>
@@ -640,52 +833,7 @@
                 </a:solidFill>
                 <a:latin typeface="Arial"/>
               </a:rPr>
-              <a:t>- Sam's </a:t>
-            </a:r>
-            <a:r>
-              <a:rPr b="0" lang="en-US" sz="1400" spc="-1" strike="noStrike">
-                <a:solidFill>
-                  <a:srgbClr val="000000"/>
-                </a:solidFill>
-                <a:latin typeface="Arial"/>
-              </a:rPr>
-              <a:t>Pizza is </a:t>
-            </a:r>
-            <a:r>
-              <a:rPr b="0" lang="en-US" sz="1400" spc="-1" strike="noStrike">
-                <a:solidFill>
-                  <a:srgbClr val="000000"/>
-                </a:solidFill>
-                <a:latin typeface="Arial"/>
-              </a:rPr>
-              <a:t>the Only </a:t>
-            </a:r>
-            <a:r>
-              <a:rPr b="0" lang="en-US" sz="1400" spc="-1" strike="noStrike">
-                <a:solidFill>
-                  <a:srgbClr val="000000"/>
-                </a:solidFill>
-                <a:latin typeface="Arial"/>
-              </a:rPr>
-              <a:t>Pizza </a:t>
-            </a:r>
-            <a:r>
-              <a:rPr b="0" lang="en-US" sz="1400" spc="-1" strike="noStrike">
-                <a:solidFill>
-                  <a:srgbClr val="000000"/>
-                </a:solidFill>
-                <a:latin typeface="Arial"/>
-              </a:rPr>
-              <a:t>Seller </a:t>
-            </a:r>
-            <a:r>
-              <a:rPr b="0" lang="en-US" sz="1400" spc="-1" strike="noStrike">
-                <a:solidFill>
-                  <a:srgbClr val="000000"/>
-                </a:solidFill>
-                <a:latin typeface="Arial"/>
-              </a:rPr>
-              <a:t>Available</a:t>
+              <a:t>- Reasoning: We lack data on competitors, so we assume a monopoly for Sam's Pizza.</a:t>
             </a:r>
             <a:endParaRPr b="0" lang="en-AU" sz="1400" spc="-1" strike="noStrike">
               <a:latin typeface="Arial"/>
@@ -708,7 +856,7 @@
                 </a:solidFill>
                 <a:latin typeface="Arial"/>
               </a:rPr>
-              <a:t>- </a:t>
+              <a:t> </a:t>
             </a:r>
             <a:r>
               <a:rPr b="0" lang="en-US" sz="1400" spc="-1" strike="noStrike">
@@ -717,273 +865,7 @@
                 </a:solidFill>
                 <a:latin typeface="Arial"/>
               </a:rPr>
-              <a:t>Reasonin</a:t>
-            </a:r>
-            <a:r>
-              <a:rPr b="0" lang="en-US" sz="1400" spc="-1" strike="noStrike">
-                <a:solidFill>
-                  <a:srgbClr val="000000"/>
-                </a:solidFill>
-                <a:latin typeface="Arial"/>
-              </a:rPr>
-              <a:t>g: We </a:t>
-            </a:r>
-            <a:r>
-              <a:rPr b="0" lang="en-US" sz="1400" spc="-1" strike="noStrike">
-                <a:solidFill>
-                  <a:srgbClr val="000000"/>
-                </a:solidFill>
-                <a:latin typeface="Arial"/>
-              </a:rPr>
-              <a:t>lack data </a:t>
-            </a:r>
-            <a:r>
-              <a:rPr b="0" lang="en-US" sz="1400" spc="-1" strike="noStrike">
-                <a:solidFill>
-                  <a:srgbClr val="000000"/>
-                </a:solidFill>
-                <a:latin typeface="Arial"/>
-              </a:rPr>
-              <a:t>on </a:t>
-            </a:r>
-            <a:r>
-              <a:rPr b="0" lang="en-US" sz="1400" spc="-1" strike="noStrike">
-                <a:solidFill>
-                  <a:srgbClr val="000000"/>
-                </a:solidFill>
-                <a:latin typeface="Arial"/>
-              </a:rPr>
-              <a:t>competito</a:t>
-            </a:r>
-            <a:r>
-              <a:rPr b="0" lang="en-US" sz="1400" spc="-1" strike="noStrike">
-                <a:solidFill>
-                  <a:srgbClr val="000000"/>
-                </a:solidFill>
-                <a:latin typeface="Arial"/>
-              </a:rPr>
-              <a:t>rs, so we </a:t>
-            </a:r>
-            <a:r>
-              <a:rPr b="0" lang="en-US" sz="1400" spc="-1" strike="noStrike">
-                <a:solidFill>
-                  <a:srgbClr val="000000"/>
-                </a:solidFill>
-                <a:latin typeface="Arial"/>
-              </a:rPr>
-              <a:t>assume a </a:t>
-            </a:r>
-            <a:r>
-              <a:rPr b="0" lang="en-US" sz="1400" spc="-1" strike="noStrike">
-                <a:solidFill>
-                  <a:srgbClr val="000000"/>
-                </a:solidFill>
-                <a:latin typeface="Arial"/>
-              </a:rPr>
-              <a:t>monopoly </a:t>
-            </a:r>
-            <a:r>
-              <a:rPr b="0" lang="en-US" sz="1400" spc="-1" strike="noStrike">
-                <a:solidFill>
-                  <a:srgbClr val="000000"/>
-                </a:solidFill>
-                <a:latin typeface="Arial"/>
-              </a:rPr>
-              <a:t>for Sam's </a:t>
-            </a:r>
-            <a:r>
-              <a:rPr b="0" lang="en-US" sz="1400" spc="-1" strike="noStrike">
-                <a:solidFill>
-                  <a:srgbClr val="000000"/>
-                </a:solidFill>
-                <a:latin typeface="Arial"/>
-              </a:rPr>
-              <a:t>Pizza.</a:t>
-            </a:r>
-            <a:endParaRPr b="0" lang="en-AU" sz="1400" spc="-1" strike="noStrike">
-              <a:latin typeface="Arial"/>
-            </a:endParaRPr>
-          </a:p>
-          <a:p>
-            <a:pPr marL="216000" indent="-216000">
-              <a:lnSpc>
-                <a:spcPct val="100000"/>
-              </a:lnSpc>
-              <a:buNone/>
-              <a:tabLst>
-                <a:tab algn="l" pos="0"/>
-              </a:tabLst>
-            </a:pPr>
-            <a:r>
-              <a:rPr b="0" lang="en-US" sz="1400" spc="-1" strike="noStrike">
-                <a:solidFill>
-                  <a:srgbClr val="000000"/>
-                </a:solidFill>
-                <a:latin typeface="Arial"/>
-              </a:rPr>
-              <a:t> </a:t>
-            </a:r>
-            <a:r>
-              <a:rPr b="0" lang="en-US" sz="1400" spc="-1" strike="noStrike">
-                <a:solidFill>
-                  <a:srgbClr val="000000"/>
-                </a:solidFill>
-                <a:latin typeface="Arial"/>
-              </a:rPr>
-              <a:t>- Validity: </a:t>
-            </a:r>
-            <a:r>
-              <a:rPr b="0" lang="en-US" sz="1400" spc="-1" strike="noStrike">
-                <a:solidFill>
-                  <a:srgbClr val="000000"/>
-                </a:solidFill>
-                <a:latin typeface="Arial"/>
-              </a:rPr>
-              <a:t>This </a:t>
-            </a:r>
-            <a:r>
-              <a:rPr b="0" lang="en-US" sz="1400" spc="-1" strike="noStrike">
-                <a:solidFill>
-                  <a:srgbClr val="000000"/>
-                </a:solidFill>
-                <a:latin typeface="Arial"/>
-              </a:rPr>
-              <a:t>simplifies </a:t>
-            </a:r>
-            <a:r>
-              <a:rPr b="0" lang="en-US" sz="1400" spc="-1" strike="noStrike">
-                <a:solidFill>
-                  <a:srgbClr val="000000"/>
-                </a:solidFill>
-                <a:latin typeface="Arial"/>
-              </a:rPr>
-              <a:t>the model </a:t>
-            </a:r>
-            <a:r>
-              <a:rPr b="0" lang="en-US" sz="1400" spc="-1" strike="noStrike">
-                <a:solidFill>
-                  <a:srgbClr val="000000"/>
-                </a:solidFill>
-                <a:latin typeface="Arial"/>
-              </a:rPr>
-              <a:t>by </a:t>
-            </a:r>
-            <a:r>
-              <a:rPr b="0" lang="en-US" sz="1400" spc="-1" strike="noStrike">
-                <a:solidFill>
-                  <a:srgbClr val="000000"/>
-                </a:solidFill>
-                <a:latin typeface="Arial"/>
-              </a:rPr>
-              <a:t>eliminatin</a:t>
-            </a:r>
-            <a:r>
-              <a:rPr b="0" lang="en-US" sz="1400" spc="-1" strike="noStrike">
-                <a:solidFill>
-                  <a:srgbClr val="000000"/>
-                </a:solidFill>
-                <a:latin typeface="Arial"/>
-              </a:rPr>
-              <a:t>g market </a:t>
-            </a:r>
-            <a:r>
-              <a:rPr b="0" lang="en-US" sz="1400" spc="-1" strike="noStrike">
-                <a:solidFill>
-                  <a:srgbClr val="000000"/>
-                </a:solidFill>
-                <a:latin typeface="Arial"/>
-              </a:rPr>
-              <a:t>competiti</a:t>
-            </a:r>
-            <a:r>
-              <a:rPr b="0" lang="en-US" sz="1400" spc="-1" strike="noStrike">
-                <a:solidFill>
-                  <a:srgbClr val="000000"/>
-                </a:solidFill>
-                <a:latin typeface="Arial"/>
-              </a:rPr>
-              <a:t>on </a:t>
-            </a:r>
-            <a:r>
-              <a:rPr b="0" lang="en-US" sz="1400" spc="-1" strike="noStrike">
-                <a:solidFill>
-                  <a:srgbClr val="000000"/>
-                </a:solidFill>
-                <a:latin typeface="Arial"/>
-              </a:rPr>
-              <a:t>variables. </a:t>
-            </a:r>
-            <a:r>
-              <a:rPr b="0" lang="en-US" sz="1400" spc="-1" strike="noStrike">
-                <a:solidFill>
-                  <a:srgbClr val="000000"/>
-                </a:solidFill>
-                <a:latin typeface="Arial"/>
-              </a:rPr>
-              <a:t>While not </a:t>
-            </a:r>
-            <a:r>
-              <a:rPr b="0" lang="en-US" sz="1400" spc="-1" strike="noStrike">
-                <a:solidFill>
-                  <a:srgbClr val="000000"/>
-                </a:solidFill>
-                <a:latin typeface="Arial"/>
-              </a:rPr>
-              <a:t>realistic, </a:t>
-            </a:r>
-            <a:r>
-              <a:rPr b="0" lang="en-US" sz="1400" spc="-1" strike="noStrike">
-                <a:solidFill>
-                  <a:srgbClr val="000000"/>
-                </a:solidFill>
-                <a:latin typeface="Arial"/>
-              </a:rPr>
-              <a:t>it's </a:t>
-            </a:r>
-            <a:r>
-              <a:rPr b="0" lang="en-US" sz="1400" spc="-1" strike="noStrike">
-                <a:solidFill>
-                  <a:srgbClr val="000000"/>
-                </a:solidFill>
-                <a:latin typeface="Arial"/>
-              </a:rPr>
-              <a:t>appropria</a:t>
-            </a:r>
-            <a:r>
-              <a:rPr b="0" lang="en-US" sz="1400" spc="-1" strike="noStrike">
-                <a:solidFill>
-                  <a:srgbClr val="000000"/>
-                </a:solidFill>
-                <a:latin typeface="Arial"/>
-              </a:rPr>
-              <a:t>te given </a:t>
-            </a:r>
-            <a:r>
-              <a:rPr b="0" lang="en-US" sz="1400" spc="-1" strike="noStrike">
-                <a:solidFill>
-                  <a:srgbClr val="000000"/>
-                </a:solidFill>
-                <a:latin typeface="Arial"/>
-              </a:rPr>
-              <a:t>the </a:t>
-            </a:r>
-            <a:r>
-              <a:rPr b="0" lang="en-US" sz="1400" spc="-1" strike="noStrike">
-                <a:solidFill>
-                  <a:srgbClr val="000000"/>
-                </a:solidFill>
-                <a:latin typeface="Arial"/>
-              </a:rPr>
-              <a:t>constraint</a:t>
-            </a:r>
-            <a:r>
-              <a:rPr b="0" lang="en-US" sz="1400" spc="-1" strike="noStrike">
-                <a:solidFill>
-                  <a:srgbClr val="000000"/>
-                </a:solidFill>
-                <a:latin typeface="Arial"/>
-              </a:rPr>
-              <a:t>s.</a:t>
+              <a:t>- Validity: This simplifies the model by eliminating market competition variables. While not realistic, it's appropriate given the constraints.</a:t>
             </a:r>
             <a:endParaRPr b="0" lang="en-AU" sz="1400" spc="-1" strike="noStrike">
               <a:latin typeface="Arial"/>
@@ -1014,76 +896,13 @@
               </a:tabLst>
             </a:pPr>
             <a:r>
-              <a:rPr b="0" lang="en-US" sz="1400" spc="-1" strike="noStrike">
+              <a:rPr b="1" lang="en-US" sz="1400" spc="-1" strike="noStrike">
                 <a:solidFill>
                   <a:srgbClr val="000000"/>
                 </a:solidFill>
                 <a:latin typeface="Arial"/>
               </a:rPr>
-              <a:t> </a:t>
-            </a:r>
-            <a:r>
-              <a:rPr b="0" lang="en-US" sz="1400" spc="-1" strike="noStrike">
-                <a:solidFill>
-                  <a:srgbClr val="000000"/>
-                </a:solidFill>
-                <a:latin typeface="Arial"/>
-              </a:rPr>
-              <a:t>- Total </a:t>
-            </a:r>
-            <a:r>
-              <a:rPr b="0" lang="en-US" sz="1400" spc="-1" strike="noStrike">
-                <a:solidFill>
-                  <a:srgbClr val="000000"/>
-                </a:solidFill>
-                <a:latin typeface="Arial"/>
-              </a:rPr>
-              <a:t>Number </a:t>
-            </a:r>
-            <a:r>
-              <a:rPr b="0" lang="en-US" sz="1400" spc="-1" strike="noStrike">
-                <a:solidFill>
-                  <a:srgbClr val="000000"/>
-                </a:solidFill>
-                <a:latin typeface="Arial"/>
-              </a:rPr>
-              <a:t>of </a:t>
-            </a:r>
-            <a:r>
-              <a:rPr b="0" lang="en-US" sz="1400" spc="-1" strike="noStrike">
-                <a:solidFill>
-                  <a:srgbClr val="000000"/>
-                </a:solidFill>
-                <a:latin typeface="Arial"/>
-              </a:rPr>
-              <a:t>Transacti</a:t>
-            </a:r>
-            <a:r>
-              <a:rPr b="0" lang="en-US" sz="1400" spc="-1" strike="noStrike">
-                <a:solidFill>
-                  <a:srgbClr val="000000"/>
-                </a:solidFill>
-                <a:latin typeface="Arial"/>
-              </a:rPr>
-              <a:t>ons </a:t>
-            </a:r>
-            <a:r>
-              <a:rPr b="0" lang="en-US" sz="1400" spc="-1" strike="noStrike">
-                <a:solidFill>
-                  <a:srgbClr val="000000"/>
-                </a:solidFill>
-                <a:latin typeface="Arial"/>
-              </a:rPr>
-              <a:t>Remains </a:t>
-            </a:r>
-            <a:r>
-              <a:rPr b="0" lang="en-US" sz="1400" spc="-1" strike="noStrike">
-                <a:solidFill>
-                  <a:srgbClr val="000000"/>
-                </a:solidFill>
-                <a:latin typeface="Arial"/>
-              </a:rPr>
-              <a:t>Constant</a:t>
+              <a:t>Total Number of Transactions Remains Constant</a:t>
             </a:r>
             <a:endParaRPr b="0" lang="en-AU" sz="1400" spc="-1" strike="noStrike">
               <a:latin typeface="Arial"/>
@@ -1115,187 +934,7 @@
                 </a:solidFill>
                 <a:latin typeface="Arial"/>
               </a:rPr>
-              <a:t>- </a:t>
-            </a:r>
-            <a:r>
-              <a:rPr b="0" lang="en-US" sz="1400" spc="-1" strike="noStrike">
-                <a:solidFill>
-                  <a:srgbClr val="000000"/>
-                </a:solidFill>
-                <a:latin typeface="Arial"/>
-              </a:rPr>
-              <a:t>Reasonin</a:t>
-            </a:r>
-            <a:r>
-              <a:rPr b="0" lang="en-US" sz="1400" spc="-1" strike="noStrike">
-                <a:solidFill>
-                  <a:srgbClr val="000000"/>
-                </a:solidFill>
-                <a:latin typeface="Arial"/>
-              </a:rPr>
-              <a:t>g: We </a:t>
-            </a:r>
-            <a:r>
-              <a:rPr b="0" lang="en-US" sz="1400" spc="-1" strike="noStrike">
-                <a:solidFill>
-                  <a:srgbClr val="000000"/>
-                </a:solidFill>
-                <a:latin typeface="Arial"/>
-              </a:rPr>
-              <a:t>assume </a:t>
-            </a:r>
-            <a:r>
-              <a:rPr b="0" lang="en-US" sz="1400" spc="-1" strike="noStrike">
-                <a:solidFill>
-                  <a:srgbClr val="000000"/>
-                </a:solidFill>
-                <a:latin typeface="Arial"/>
-              </a:rPr>
-              <a:t>that </a:t>
-            </a:r>
-            <a:r>
-              <a:rPr b="0" lang="en-US" sz="1400" spc="-1" strike="noStrike">
-                <a:solidFill>
-                  <a:srgbClr val="000000"/>
-                </a:solidFill>
-                <a:latin typeface="Arial"/>
-              </a:rPr>
-              <a:t>consume</a:t>
-            </a:r>
-            <a:r>
-              <a:rPr b="0" lang="en-US" sz="1400" spc="-1" strike="noStrike">
-                <a:solidFill>
-                  <a:srgbClr val="000000"/>
-                </a:solidFill>
-                <a:latin typeface="Arial"/>
-              </a:rPr>
-              <a:t>rs have </a:t>
-            </a:r>
-            <a:r>
-              <a:rPr b="0" lang="en-US" sz="1400" spc="-1" strike="noStrike">
-                <a:solidFill>
-                  <a:srgbClr val="000000"/>
-                </a:solidFill>
-                <a:latin typeface="Arial"/>
-              </a:rPr>
-              <a:t>already </a:t>
-            </a:r>
-            <a:r>
-              <a:rPr b="0" lang="en-US" sz="1400" spc="-1" strike="noStrike">
-                <a:solidFill>
-                  <a:srgbClr val="000000"/>
-                </a:solidFill>
-                <a:latin typeface="Arial"/>
-              </a:rPr>
-              <a:t>decided </a:t>
-            </a:r>
-            <a:r>
-              <a:rPr b="0" lang="en-US" sz="1400" spc="-1" strike="noStrike">
-                <a:solidFill>
-                  <a:srgbClr val="000000"/>
-                </a:solidFill>
-                <a:latin typeface="Arial"/>
-              </a:rPr>
-              <a:t>to </a:t>
-            </a:r>
-            <a:r>
-              <a:rPr b="0" lang="en-US" sz="1400" spc="-1" strike="noStrike">
-                <a:solidFill>
-                  <a:srgbClr val="000000"/>
-                </a:solidFill>
-                <a:latin typeface="Arial"/>
-              </a:rPr>
-              <a:t>purchase </a:t>
-            </a:r>
-            <a:r>
-              <a:rPr b="0" lang="en-US" sz="1400" spc="-1" strike="noStrike">
-                <a:solidFill>
-                  <a:srgbClr val="000000"/>
-                </a:solidFill>
-                <a:latin typeface="Arial"/>
-              </a:rPr>
-              <a:t>pizza, </a:t>
-            </a:r>
-            <a:r>
-              <a:rPr b="0" lang="en-US" sz="1400" spc="-1" strike="noStrike">
-                <a:solidFill>
-                  <a:srgbClr val="000000"/>
-                </a:solidFill>
-                <a:latin typeface="Arial"/>
-              </a:rPr>
-              <a:t>and the </a:t>
-            </a:r>
-            <a:r>
-              <a:rPr b="0" lang="en-US" sz="1400" spc="-1" strike="noStrike">
-                <a:solidFill>
-                  <a:srgbClr val="000000"/>
-                </a:solidFill>
-                <a:latin typeface="Arial"/>
-              </a:rPr>
-              <a:t>primary </a:t>
-            </a:r>
-            <a:r>
-              <a:rPr b="0" lang="en-US" sz="1400" spc="-1" strike="noStrike">
-                <a:solidFill>
-                  <a:srgbClr val="000000"/>
-                </a:solidFill>
-                <a:latin typeface="Arial"/>
-              </a:rPr>
-              <a:t>variable </a:t>
-            </a:r>
-            <a:r>
-              <a:rPr b="0" lang="en-US" sz="1400" spc="-1" strike="noStrike">
-                <a:solidFill>
-                  <a:srgbClr val="000000"/>
-                </a:solidFill>
-                <a:latin typeface="Arial"/>
-              </a:rPr>
-              <a:t>is the </a:t>
-            </a:r>
-            <a:r>
-              <a:rPr b="0" lang="en-US" sz="1400" spc="-1" strike="noStrike">
-                <a:solidFill>
-                  <a:srgbClr val="000000"/>
-                </a:solidFill>
-                <a:latin typeface="Arial"/>
-              </a:rPr>
-              <a:t>quantity </a:t>
-            </a:r>
-            <a:r>
-              <a:rPr b="0" lang="en-US" sz="1400" spc="-1" strike="noStrike">
-                <a:solidFill>
-                  <a:srgbClr val="000000"/>
-                </a:solidFill>
-                <a:latin typeface="Arial"/>
-              </a:rPr>
-              <a:t>purchase</a:t>
-            </a:r>
-            <a:r>
-              <a:rPr b="0" lang="en-US" sz="1400" spc="-1" strike="noStrike">
-                <a:solidFill>
-                  <a:srgbClr val="000000"/>
-                </a:solidFill>
-                <a:latin typeface="Arial"/>
-              </a:rPr>
-              <a:t>d at </a:t>
-            </a:r>
-            <a:r>
-              <a:rPr b="0" lang="en-US" sz="1400" spc="-1" strike="noStrike">
-                <a:solidFill>
-                  <a:srgbClr val="000000"/>
-                </a:solidFill>
-                <a:latin typeface="Arial"/>
-              </a:rPr>
-              <a:t>different </a:t>
-            </a:r>
-            <a:r>
-              <a:rPr b="0" lang="en-US" sz="1400" spc="-1" strike="noStrike">
-                <a:solidFill>
-                  <a:srgbClr val="000000"/>
-                </a:solidFill>
-                <a:latin typeface="Arial"/>
-              </a:rPr>
-              <a:t>prices.</a:t>
+              <a:t>- Reasoning: We assume that consumers have already decided to purchase pizza, and the primary variables is the quantity purchased at different prices.</a:t>
             </a:r>
             <a:endParaRPr b="0" lang="en-AU" sz="1400" spc="-1" strike="noStrike">
               <a:latin typeface="Arial"/>
@@ -1327,178 +966,7 @@
                 </a:solidFill>
                 <a:latin typeface="Arial"/>
               </a:rPr>
-              <a:t>- </a:t>
-            </a:r>
-            <a:r>
-              <a:rPr b="0" lang="en-US" sz="1400" spc="-1" strike="noStrike">
-                <a:solidFill>
-                  <a:srgbClr val="000000"/>
-                </a:solidFill>
-                <a:latin typeface="Arial"/>
-              </a:rPr>
-              <a:t>Substitut</a:t>
-            </a:r>
-            <a:r>
-              <a:rPr b="0" lang="en-US" sz="1400" spc="-1" strike="noStrike">
-                <a:solidFill>
-                  <a:srgbClr val="000000"/>
-                </a:solidFill>
-                <a:latin typeface="Arial"/>
-              </a:rPr>
-              <a:t>es: We </a:t>
-            </a:r>
-            <a:r>
-              <a:rPr b="0" lang="en-US" sz="1400" spc="-1" strike="noStrike">
-                <a:solidFill>
-                  <a:srgbClr val="000000"/>
-                </a:solidFill>
-                <a:latin typeface="Arial"/>
-              </a:rPr>
-              <a:t>lack data </a:t>
-            </a:r>
-            <a:r>
-              <a:rPr b="0" lang="en-US" sz="1400" spc="-1" strike="noStrike">
-                <a:solidFill>
-                  <a:srgbClr val="000000"/>
-                </a:solidFill>
-                <a:latin typeface="Arial"/>
-              </a:rPr>
-              <a:t>on </a:t>
-            </a:r>
-            <a:r>
-              <a:rPr b="0" lang="en-US" sz="1400" spc="-1" strike="noStrike">
-                <a:solidFill>
-                  <a:srgbClr val="000000"/>
-                </a:solidFill>
-                <a:latin typeface="Arial"/>
-              </a:rPr>
-              <a:t>substitute</a:t>
-            </a:r>
-            <a:r>
-              <a:rPr b="0" lang="en-US" sz="1400" spc="-1" strike="noStrike">
-                <a:solidFill>
-                  <a:srgbClr val="000000"/>
-                </a:solidFill>
-                <a:latin typeface="Arial"/>
-              </a:rPr>
-              <a:t>s (e.g., </a:t>
-            </a:r>
-            <a:r>
-              <a:rPr b="0" lang="en-US" sz="1400" spc="-1" strike="noStrike">
-                <a:solidFill>
-                  <a:srgbClr val="000000"/>
-                </a:solidFill>
-                <a:latin typeface="Arial"/>
-              </a:rPr>
-              <a:t>burgers), </a:t>
-            </a:r>
-            <a:r>
-              <a:rPr b="0" lang="en-US" sz="1400" spc="-1" strike="noStrike">
-                <a:solidFill>
-                  <a:srgbClr val="000000"/>
-                </a:solidFill>
-                <a:latin typeface="Arial"/>
-              </a:rPr>
-              <a:t>so we </a:t>
-            </a:r>
-            <a:r>
-              <a:rPr b="0" lang="en-US" sz="1400" spc="-1" strike="noStrike">
-                <a:solidFill>
-                  <a:srgbClr val="000000"/>
-                </a:solidFill>
-                <a:latin typeface="Arial"/>
-              </a:rPr>
-              <a:t>assume </a:t>
-            </a:r>
-            <a:r>
-              <a:rPr b="0" lang="en-US" sz="1400" spc="-1" strike="noStrike">
-                <a:solidFill>
-                  <a:srgbClr val="000000"/>
-                </a:solidFill>
-                <a:latin typeface="Arial"/>
-              </a:rPr>
-              <a:t>the </a:t>
-            </a:r>
-            <a:r>
-              <a:rPr b="0" lang="en-US" sz="1400" spc="-1" strike="noStrike">
-                <a:solidFill>
-                  <a:srgbClr val="000000"/>
-                </a:solidFill>
-                <a:latin typeface="Arial"/>
-              </a:rPr>
-              <a:t>decision </a:t>
-            </a:r>
-            <a:r>
-              <a:rPr b="0" lang="en-US" sz="1400" spc="-1" strike="noStrike">
-                <a:solidFill>
-                  <a:srgbClr val="000000"/>
-                </a:solidFill>
-                <a:latin typeface="Arial"/>
-              </a:rPr>
-              <a:t>is </a:t>
-            </a:r>
-            <a:r>
-              <a:rPr b="0" lang="en-US" sz="1400" spc="-1" strike="noStrike">
-                <a:solidFill>
-                  <a:srgbClr val="000000"/>
-                </a:solidFill>
-                <a:latin typeface="Arial"/>
-              </a:rPr>
-              <a:t>between </a:t>
-            </a:r>
-            <a:r>
-              <a:rPr b="0" lang="en-US" sz="1400" spc="-1" strike="noStrike">
-                <a:solidFill>
-                  <a:srgbClr val="000000"/>
-                </a:solidFill>
-                <a:latin typeface="Arial"/>
-              </a:rPr>
-              <a:t>different </a:t>
-            </a:r>
-            <a:r>
-              <a:rPr b="0" lang="en-US" sz="1400" spc="-1" strike="noStrike">
-                <a:solidFill>
-                  <a:srgbClr val="000000"/>
-                </a:solidFill>
-                <a:latin typeface="Arial"/>
-              </a:rPr>
-              <a:t>quantities </a:t>
-            </a:r>
-            <a:r>
-              <a:rPr b="0" lang="en-US" sz="1400" spc="-1" strike="noStrike">
-                <a:solidFill>
-                  <a:srgbClr val="000000"/>
-                </a:solidFill>
-                <a:latin typeface="Arial"/>
-              </a:rPr>
-              <a:t>of pizza </a:t>
-            </a:r>
-            <a:r>
-              <a:rPr b="0" lang="en-US" sz="1400" spc="-1" strike="noStrike">
-                <a:solidFill>
-                  <a:srgbClr val="000000"/>
-                </a:solidFill>
-                <a:latin typeface="Arial"/>
-              </a:rPr>
-              <a:t>from </a:t>
-            </a:r>
-            <a:r>
-              <a:rPr b="0" lang="en-US" sz="1400" spc="-1" strike="noStrike">
-                <a:solidFill>
-                  <a:srgbClr val="000000"/>
-                </a:solidFill>
-                <a:latin typeface="Arial"/>
-              </a:rPr>
-              <a:t>Sam's </a:t>
-            </a:r>
-            <a:r>
-              <a:rPr b="0" lang="en-US" sz="1400" spc="-1" strike="noStrike">
-                <a:solidFill>
-                  <a:srgbClr val="000000"/>
-                </a:solidFill>
-                <a:latin typeface="Arial"/>
-              </a:rPr>
-              <a:t>Pizza.</a:t>
+              <a:t>- Substitutes: We lack data on substitutes (e.g., burgers), so we assume the decision is between different quantities of pizza from Sam's Pizza.</a:t>
             </a:r>
             <a:endParaRPr b="0" lang="en-AU" sz="1400" spc="-1" strike="noStrike">
               <a:latin typeface="Arial"/>
@@ -1529,7 +997,7 @@
               </a:tabLst>
             </a:pPr>
             <a:r>
-              <a:rPr b="0" lang="en-US" sz="1400" spc="-1" strike="noStrike">
+              <a:rPr b="1" lang="en-US" sz="1400" spc="-1" strike="noStrike">
                 <a:solidFill>
                   <a:srgbClr val="000000"/>
                 </a:solidFill>
@@ -1538,40 +1006,13 @@
               <a:t> </a:t>
             </a:r>
             <a:r>
-              <a:rPr b="0" lang="en-US" sz="1400" spc="-1" strike="noStrike">
+              <a:rPr b="1" lang="en-US" sz="1400" spc="-1" strike="noStrike">
                 <a:solidFill>
                   <a:srgbClr val="000000"/>
                 </a:solidFill>
                 <a:latin typeface="Arial"/>
               </a:rPr>
-              <a:t>Only Price </a:t>
-            </a:r>
-            <a:r>
-              <a:rPr b="0" lang="en-US" sz="1400" spc="-1" strike="noStrike">
-                <a:solidFill>
-                  <a:srgbClr val="000000"/>
-                </a:solidFill>
-                <a:latin typeface="Arial"/>
-              </a:rPr>
-              <a:t>and </a:t>
-            </a:r>
-            <a:r>
-              <a:rPr b="0" lang="en-US" sz="1400" spc="-1" strike="noStrike">
-                <a:solidFill>
-                  <a:srgbClr val="000000"/>
-                </a:solidFill>
-                <a:latin typeface="Arial"/>
-              </a:rPr>
-              <a:t>Quantity </a:t>
-            </a:r>
-            <a:r>
-              <a:rPr b="0" lang="en-US" sz="1400" spc="-1" strike="noStrike">
-                <a:solidFill>
-                  <a:srgbClr val="000000"/>
-                </a:solidFill>
-                <a:latin typeface="Arial"/>
-              </a:rPr>
-              <a:t>Change</a:t>
+              <a:t>Only Price and Quantity Change</a:t>
             </a:r>
             <a:endParaRPr b="0" lang="en-AU" sz="1400" spc="-1" strike="noStrike">
               <a:latin typeface="Arial"/>
@@ -1603,187 +1044,7 @@
                 </a:solidFill>
                 <a:latin typeface="Arial"/>
               </a:rPr>
-              <a:t>- </a:t>
-            </a:r>
-            <a:r>
-              <a:rPr b="0" lang="en-US" sz="1400" spc="-1" strike="noStrike">
-                <a:solidFill>
-                  <a:srgbClr val="000000"/>
-                </a:solidFill>
-                <a:latin typeface="Arial"/>
-              </a:rPr>
-              <a:t>Reasonin</a:t>
-            </a:r>
-            <a:r>
-              <a:rPr b="0" lang="en-US" sz="1400" spc="-1" strike="noStrike">
-                <a:solidFill>
-                  <a:srgbClr val="000000"/>
-                </a:solidFill>
-                <a:latin typeface="Arial"/>
-              </a:rPr>
-              <a:t>g: All </a:t>
-            </a:r>
-            <a:r>
-              <a:rPr b="0" lang="en-US" sz="1400" spc="-1" strike="noStrike">
-                <a:solidFill>
-                  <a:srgbClr val="000000"/>
-                </a:solidFill>
-                <a:latin typeface="Arial"/>
-              </a:rPr>
-              <a:t>other </a:t>
-            </a:r>
-            <a:r>
-              <a:rPr b="0" lang="en-US" sz="1400" spc="-1" strike="noStrike">
-                <a:solidFill>
-                  <a:srgbClr val="000000"/>
-                </a:solidFill>
-                <a:latin typeface="Arial"/>
-              </a:rPr>
-              <a:t>variables </a:t>
-            </a:r>
-            <a:r>
-              <a:rPr b="0" lang="en-US" sz="1400" spc="-1" strike="noStrike">
-                <a:solidFill>
-                  <a:srgbClr val="000000"/>
-                </a:solidFill>
-                <a:latin typeface="Arial"/>
-              </a:rPr>
-              <a:t>(e.g., </a:t>
-            </a:r>
-            <a:r>
-              <a:rPr b="0" lang="en-US" sz="1400" spc="-1" strike="noStrike">
-                <a:solidFill>
-                  <a:srgbClr val="000000"/>
-                </a:solidFill>
-                <a:latin typeface="Arial"/>
-              </a:rPr>
-              <a:t>marketin</a:t>
-            </a:r>
-            <a:r>
-              <a:rPr b="0" lang="en-US" sz="1400" spc="-1" strike="noStrike">
-                <a:solidFill>
-                  <a:srgbClr val="000000"/>
-                </a:solidFill>
-                <a:latin typeface="Arial"/>
-              </a:rPr>
-              <a:t>g efforts, </a:t>
-            </a:r>
-            <a:r>
-              <a:rPr b="0" lang="en-US" sz="1400" spc="-1" strike="noStrike">
-                <a:solidFill>
-                  <a:srgbClr val="000000"/>
-                </a:solidFill>
-                <a:latin typeface="Arial"/>
-              </a:rPr>
-              <a:t>economic </a:t>
-            </a:r>
-            <a:r>
-              <a:rPr b="0" lang="en-US" sz="1400" spc="-1" strike="noStrike">
-                <a:solidFill>
-                  <a:srgbClr val="000000"/>
-                </a:solidFill>
-                <a:latin typeface="Arial"/>
-              </a:rPr>
-              <a:t>condition</a:t>
-            </a:r>
-            <a:r>
-              <a:rPr b="0" lang="en-US" sz="1400" spc="-1" strike="noStrike">
-                <a:solidFill>
-                  <a:srgbClr val="000000"/>
-                </a:solidFill>
-                <a:latin typeface="Arial"/>
-              </a:rPr>
-              <a:t>s) are </a:t>
-            </a:r>
-            <a:r>
-              <a:rPr b="0" lang="en-US" sz="1400" spc="-1" strike="noStrike">
-                <a:solidFill>
-                  <a:srgbClr val="000000"/>
-                </a:solidFill>
-                <a:latin typeface="Arial"/>
-              </a:rPr>
-              <a:t>held </a:t>
-            </a:r>
-            <a:r>
-              <a:rPr b="0" lang="en-US" sz="1400" spc="-1" strike="noStrike">
-                <a:solidFill>
-                  <a:srgbClr val="000000"/>
-                </a:solidFill>
-                <a:latin typeface="Arial"/>
-              </a:rPr>
-              <a:t>constant </a:t>
-            </a:r>
-            <a:r>
-              <a:rPr b="0" lang="en-US" sz="1400" spc="-1" strike="noStrike">
-                <a:solidFill>
-                  <a:srgbClr val="000000"/>
-                </a:solidFill>
-                <a:latin typeface="Arial"/>
-              </a:rPr>
-              <a:t>to isolate </a:t>
-            </a:r>
-            <a:r>
-              <a:rPr b="0" lang="en-US" sz="1400" spc="-1" strike="noStrike">
-                <a:solidFill>
-                  <a:srgbClr val="000000"/>
-                </a:solidFill>
-                <a:latin typeface="Arial"/>
-              </a:rPr>
-              <a:t>the effect </a:t>
-            </a:r>
-            <a:r>
-              <a:rPr b="0" lang="en-US" sz="1400" spc="-1" strike="noStrike">
-                <a:solidFill>
-                  <a:srgbClr val="000000"/>
-                </a:solidFill>
-                <a:latin typeface="Arial"/>
-              </a:rPr>
-              <a:t>of price </a:t>
-            </a:r>
-            <a:r>
-              <a:rPr b="0" lang="en-US" sz="1400" spc="-1" strike="noStrike">
-                <a:solidFill>
-                  <a:srgbClr val="000000"/>
-                </a:solidFill>
-                <a:latin typeface="Arial"/>
-              </a:rPr>
-              <a:t>changes </a:t>
-            </a:r>
-            <a:r>
-              <a:rPr b="0" lang="en-US" sz="1400" spc="-1" strike="noStrike">
-                <a:solidFill>
-                  <a:srgbClr val="000000"/>
-                </a:solidFill>
-                <a:latin typeface="Arial"/>
-              </a:rPr>
-              <a:t>on </a:t>
-            </a:r>
-            <a:r>
-              <a:rPr b="0" lang="en-US" sz="1400" spc="-1" strike="noStrike">
-                <a:solidFill>
-                  <a:srgbClr val="000000"/>
-                </a:solidFill>
-                <a:latin typeface="Arial"/>
-              </a:rPr>
-              <a:t>quantity </a:t>
-            </a:r>
-            <a:r>
-              <a:rPr b="0" lang="en-US" sz="1400" spc="-1" strike="noStrike">
-                <a:solidFill>
-                  <a:srgbClr val="000000"/>
-                </a:solidFill>
-                <a:latin typeface="Arial"/>
-              </a:rPr>
-              <a:t>demande</a:t>
-            </a:r>
-            <a:r>
-              <a:rPr b="0" lang="en-US" sz="1400" spc="-1" strike="noStrike">
-                <a:solidFill>
-                  <a:srgbClr val="000000"/>
-                </a:solidFill>
-                <a:latin typeface="Arial"/>
-              </a:rPr>
-              <a:t>d.</a:t>
+              <a:t>- Reasoning: All other variables (e.g., marketing efforts, economic conditions) are held constant to isolate the effect of price changes on quantity demanded.</a:t>
             </a:r>
             <a:endParaRPr b="0" lang="en-AU" sz="1400" spc="-1" strike="noStrike">
               <a:latin typeface="Arial"/>
@@ -1814,67 +1075,13 @@
               </a:tabLst>
             </a:pPr>
             <a:r>
-              <a:rPr b="0" lang="en-US" sz="1400" spc="-1" strike="noStrike">
+              <a:rPr b="1" lang="en-US" sz="1400" spc="-1" strike="noStrike">
                 <a:solidFill>
                   <a:srgbClr val="000000"/>
                 </a:solidFill>
                 <a:latin typeface="Arial"/>
               </a:rPr>
-              <a:t> </a:t>
-            </a:r>
-            <a:r>
-              <a:rPr b="0" lang="en-US" sz="1400" spc="-1" strike="noStrike">
-                <a:solidFill>
-                  <a:srgbClr val="000000"/>
-                </a:solidFill>
-                <a:latin typeface="Arial"/>
-              </a:rPr>
-              <a:t>Consumer </a:t>
-            </a:r>
-            <a:r>
-              <a:rPr b="0" lang="en-US" sz="1400" spc="-1" strike="noStrike">
-                <a:solidFill>
-                  <a:srgbClr val="000000"/>
-                </a:solidFill>
-                <a:latin typeface="Arial"/>
-              </a:rPr>
-              <a:t>Preferenc</a:t>
-            </a:r>
-            <a:r>
-              <a:rPr b="0" lang="en-US" sz="1400" spc="-1" strike="noStrike">
-                <a:solidFill>
-                  <a:srgbClr val="000000"/>
-                </a:solidFill>
-                <a:latin typeface="Arial"/>
-              </a:rPr>
-              <a:t>es and </a:t>
-            </a:r>
-            <a:r>
-              <a:rPr b="0" lang="en-US" sz="1400" spc="-1" strike="noStrike">
-                <a:solidFill>
-                  <a:srgbClr val="000000"/>
-                </a:solidFill>
-                <a:latin typeface="Arial"/>
-              </a:rPr>
-              <a:t>Behavior</a:t>
-            </a:r>
-            <a:r>
-              <a:rPr b="0" lang="en-US" sz="1400" spc="-1" strike="noStrike">
-                <a:solidFill>
-                  <a:srgbClr val="000000"/>
-                </a:solidFill>
-                <a:latin typeface="Arial"/>
-              </a:rPr>
-              <a:t>s Remain </a:t>
-            </a:r>
-            <a:r>
-              <a:rPr b="0" lang="en-US" sz="1400" spc="-1" strike="noStrike">
-                <a:solidFill>
-                  <a:srgbClr val="000000"/>
-                </a:solidFill>
-                <a:latin typeface="Arial"/>
-              </a:rPr>
-              <a:t>Constant</a:t>
+              <a:t>Consumer Preferences and Behaviors Remain Constant</a:t>
             </a:r>
             <a:endParaRPr b="0" lang="en-AU" sz="1400" spc="-1" strike="noStrike">
               <a:latin typeface="Arial"/>
@@ -1906,160 +1113,7 @@
                 </a:solidFill>
                 <a:latin typeface="Arial"/>
               </a:rPr>
-              <a:t>- </a:t>
-            </a:r>
-            <a:r>
-              <a:rPr b="0" lang="en-US" sz="1400" spc="-1" strike="noStrike">
-                <a:solidFill>
-                  <a:srgbClr val="000000"/>
-                </a:solidFill>
-                <a:latin typeface="Arial"/>
-              </a:rPr>
-              <a:t>Reasonin</a:t>
-            </a:r>
-            <a:r>
-              <a:rPr b="0" lang="en-US" sz="1400" spc="-1" strike="noStrike">
-                <a:solidFill>
-                  <a:srgbClr val="000000"/>
-                </a:solidFill>
-                <a:latin typeface="Arial"/>
-              </a:rPr>
-              <a:t>g: We </a:t>
-            </a:r>
-            <a:r>
-              <a:rPr b="0" lang="en-US" sz="1400" spc="-1" strike="noStrike">
-                <a:solidFill>
-                  <a:srgbClr val="000000"/>
-                </a:solidFill>
-                <a:latin typeface="Arial"/>
-              </a:rPr>
-              <a:t>assume </a:t>
-            </a:r>
-            <a:r>
-              <a:rPr b="0" lang="en-US" sz="1400" spc="-1" strike="noStrike">
-                <a:solidFill>
-                  <a:srgbClr val="000000"/>
-                </a:solidFill>
-                <a:latin typeface="Arial"/>
-              </a:rPr>
-              <a:t>that </a:t>
-            </a:r>
-            <a:r>
-              <a:rPr b="0" lang="en-US" sz="1400" spc="-1" strike="noStrike">
-                <a:solidFill>
-                  <a:srgbClr val="000000"/>
-                </a:solidFill>
-                <a:latin typeface="Arial"/>
-              </a:rPr>
-              <a:t>consume</a:t>
-            </a:r>
-            <a:r>
-              <a:rPr b="0" lang="en-US" sz="1400" spc="-1" strike="noStrike">
-                <a:solidFill>
-                  <a:srgbClr val="000000"/>
-                </a:solidFill>
-                <a:latin typeface="Arial"/>
-              </a:rPr>
-              <a:t>r </a:t>
-            </a:r>
-            <a:r>
-              <a:rPr b="0" lang="en-US" sz="1400" spc="-1" strike="noStrike">
-                <a:solidFill>
-                  <a:srgbClr val="000000"/>
-                </a:solidFill>
-                <a:latin typeface="Arial"/>
-              </a:rPr>
-              <a:t>preferenc</a:t>
-            </a:r>
-            <a:r>
-              <a:rPr b="0" lang="en-US" sz="1400" spc="-1" strike="noStrike">
-                <a:solidFill>
-                  <a:srgbClr val="000000"/>
-                </a:solidFill>
-                <a:latin typeface="Arial"/>
-              </a:rPr>
-              <a:t>es, </a:t>
-            </a:r>
-            <a:r>
-              <a:rPr b="0" lang="en-US" sz="1400" spc="-1" strike="noStrike">
-                <a:solidFill>
-                  <a:srgbClr val="000000"/>
-                </a:solidFill>
-                <a:latin typeface="Arial"/>
-              </a:rPr>
-              <a:t>tastes, </a:t>
-            </a:r>
-            <a:r>
-              <a:rPr b="0" lang="en-US" sz="1400" spc="-1" strike="noStrike">
-                <a:solidFill>
-                  <a:srgbClr val="000000"/>
-                </a:solidFill>
-                <a:latin typeface="Arial"/>
-              </a:rPr>
-              <a:t>and </a:t>
-            </a:r>
-            <a:r>
-              <a:rPr b="0" lang="en-US" sz="1400" spc="-1" strike="noStrike">
-                <a:solidFill>
-                  <a:srgbClr val="000000"/>
-                </a:solidFill>
-                <a:latin typeface="Arial"/>
-              </a:rPr>
-              <a:t>behavior</a:t>
-            </a:r>
-            <a:r>
-              <a:rPr b="0" lang="en-US" sz="1400" spc="-1" strike="noStrike">
-                <a:solidFill>
-                  <a:srgbClr val="000000"/>
-                </a:solidFill>
-                <a:latin typeface="Arial"/>
-              </a:rPr>
-              <a:t>s do not </a:t>
-            </a:r>
-            <a:r>
-              <a:rPr b="0" lang="en-US" sz="1400" spc="-1" strike="noStrike">
-                <a:solidFill>
-                  <a:srgbClr val="000000"/>
-                </a:solidFill>
-                <a:latin typeface="Arial"/>
-              </a:rPr>
-              <a:t>change </a:t>
-            </a:r>
-            <a:r>
-              <a:rPr b="0" lang="en-US" sz="1400" spc="-1" strike="noStrike">
-                <a:solidFill>
-                  <a:srgbClr val="000000"/>
-                </a:solidFill>
-                <a:latin typeface="Arial"/>
-              </a:rPr>
-              <a:t>during </a:t>
-            </a:r>
-            <a:r>
-              <a:rPr b="0" lang="en-US" sz="1400" spc="-1" strike="noStrike">
-                <a:solidFill>
-                  <a:srgbClr val="000000"/>
-                </a:solidFill>
-                <a:latin typeface="Arial"/>
-              </a:rPr>
-              <a:t>the </a:t>
-            </a:r>
-            <a:r>
-              <a:rPr b="0" lang="en-US" sz="1400" spc="-1" strike="noStrike">
-                <a:solidFill>
-                  <a:srgbClr val="000000"/>
-                </a:solidFill>
-                <a:latin typeface="Arial"/>
-              </a:rPr>
-              <a:t>period of </a:t>
-            </a:r>
-            <a:r>
-              <a:rPr b="0" lang="en-US" sz="1400" spc="-1" strike="noStrike">
-                <a:solidFill>
-                  <a:srgbClr val="000000"/>
-                </a:solidFill>
-                <a:latin typeface="Arial"/>
-              </a:rPr>
-              <a:t>analysis.</a:t>
+              <a:t>- Reasoning: We assume that consumer preferences, tastes, and behaviors do not change during the period of analysis.</a:t>
             </a:r>
             <a:endParaRPr b="0" lang="en-AU" sz="1400" spc="-1" strike="noStrike">
               <a:latin typeface="Arial"/>
@@ -2091,115 +1145,7 @@
                 </a:solidFill>
                 <a:latin typeface="Arial"/>
               </a:rPr>
-              <a:t>- Validity: </a:t>
-            </a:r>
-            <a:r>
-              <a:rPr b="0" lang="en-US" sz="1400" spc="-1" strike="noStrike">
-                <a:solidFill>
-                  <a:srgbClr val="000000"/>
-                </a:solidFill>
-                <a:latin typeface="Arial"/>
-              </a:rPr>
-              <a:t>This is a </a:t>
-            </a:r>
-            <a:r>
-              <a:rPr b="0" lang="en-US" sz="1400" spc="-1" strike="noStrike">
-                <a:solidFill>
-                  <a:srgbClr val="000000"/>
-                </a:solidFill>
-                <a:latin typeface="Arial"/>
-              </a:rPr>
-              <a:t>common </a:t>
-            </a:r>
-            <a:r>
-              <a:rPr b="0" lang="en-US" sz="1400" spc="-1" strike="noStrike">
-                <a:solidFill>
-                  <a:srgbClr val="000000"/>
-                </a:solidFill>
-                <a:latin typeface="Arial"/>
-              </a:rPr>
-              <a:t>assumpti</a:t>
-            </a:r>
-            <a:r>
-              <a:rPr b="0" lang="en-US" sz="1400" spc="-1" strike="noStrike">
-                <a:solidFill>
-                  <a:srgbClr val="000000"/>
-                </a:solidFill>
-                <a:latin typeface="Arial"/>
-              </a:rPr>
-              <a:t>on in </a:t>
-            </a:r>
-            <a:r>
-              <a:rPr b="0" lang="en-US" sz="1400" spc="-1" strike="noStrike">
-                <a:solidFill>
-                  <a:srgbClr val="000000"/>
-                </a:solidFill>
-                <a:latin typeface="Arial"/>
-              </a:rPr>
-              <a:t>short-</a:t>
-            </a:r>
-            <a:r>
-              <a:rPr b="0" lang="en-US" sz="1400" spc="-1" strike="noStrike">
-                <a:solidFill>
-                  <a:srgbClr val="000000"/>
-                </a:solidFill>
-                <a:latin typeface="Arial"/>
-              </a:rPr>
-              <a:t>term </a:t>
-            </a:r>
-            <a:r>
-              <a:rPr b="0" lang="en-US" sz="1400" spc="-1" strike="noStrike">
-                <a:solidFill>
-                  <a:srgbClr val="000000"/>
-                </a:solidFill>
-                <a:latin typeface="Arial"/>
-              </a:rPr>
-              <a:t>studies </a:t>
-            </a:r>
-            <a:r>
-              <a:rPr b="0" lang="en-US" sz="1400" spc="-1" strike="noStrike">
-                <a:solidFill>
-                  <a:srgbClr val="000000"/>
-                </a:solidFill>
-                <a:latin typeface="Arial"/>
-              </a:rPr>
-              <a:t>but may </a:t>
-            </a:r>
-            <a:r>
-              <a:rPr b="0" lang="en-US" sz="1400" spc="-1" strike="noStrike">
-                <a:solidFill>
-                  <a:srgbClr val="000000"/>
-                </a:solidFill>
-                <a:latin typeface="Arial"/>
-              </a:rPr>
-              <a:t>not hold </a:t>
-            </a:r>
-            <a:r>
-              <a:rPr b="0" lang="en-US" sz="1400" spc="-1" strike="noStrike">
-                <a:solidFill>
-                  <a:srgbClr val="000000"/>
-                </a:solidFill>
-                <a:latin typeface="Arial"/>
-              </a:rPr>
-              <a:t>in the </a:t>
-            </a:r>
-            <a:r>
-              <a:rPr b="0" lang="en-US" sz="1400" spc="-1" strike="noStrike">
-                <a:solidFill>
-                  <a:srgbClr val="000000"/>
-                </a:solidFill>
-                <a:latin typeface="Arial"/>
-              </a:rPr>
-              <a:t>long </a:t>
-            </a:r>
-            <a:r>
-              <a:rPr b="0" lang="en-US" sz="1400" spc="-1" strike="noStrike">
-                <a:solidFill>
-                  <a:srgbClr val="000000"/>
-                </a:solidFill>
-                <a:latin typeface="Arial"/>
-              </a:rPr>
-              <a:t>term.</a:t>
+              <a:t>- Validity: This is a common assumption in short-term studies but may not hold in the long term.</a:t>
             </a:r>
             <a:endParaRPr b="0" lang="en-AU" sz="1400" spc="-1" strike="noStrike">
               <a:latin typeface="Arial"/>
@@ -2231,7 +1177,7 @@
       </p:grpSpPr>
       <p:sp>
         <p:nvSpPr>
-          <p:cNvPr id="117" name="PlaceHolder 1"/>
+          <p:cNvPr id="119" name="PlaceHolder 1"/>
           <p:cNvSpPr>
             <a:spLocks noGrp="1"/>
           </p:cNvSpPr>
@@ -2242,7 +1188,7 @@
         <p:spPr>
           <a:xfrm>
             <a:off x="216000" y="812520"/>
-            <a:ext cx="7127280" cy="4008960"/>
+            <a:ext cx="7126560" cy="4008240"/>
           </a:xfrm>
           <a:prstGeom prst="rect">
             <a:avLst/>
@@ -2254,7 +1200,7 @@
       </p:sp>
       <p:sp>
         <p:nvSpPr>
-          <p:cNvPr id="118" name="PlaceHolder 2"/>
+          <p:cNvPr id="120" name="PlaceHolder 2"/>
           <p:cNvSpPr>
             <a:spLocks noGrp="1"/>
           </p:cNvSpPr>
@@ -2265,7 +1211,7 @@
         <p:spPr>
           <a:xfrm>
             <a:off x="756000" y="5078520"/>
-            <a:ext cx="6047640" cy="4811040"/>
+            <a:ext cx="6046920" cy="4810320"/>
           </a:xfrm>
           <a:prstGeom prst="rect">
             <a:avLst/>
@@ -2281,6 +1227,9 @@
           </a:bodyPr>
           <a:p>
             <a:pPr marL="216000" indent="-216000">
+              <a:lnSpc>
+                <a:spcPct val="100000"/>
+              </a:lnSpc>
               <a:buClr>
                 <a:srgbClr val="000000"/>
               </a:buClr>
@@ -2299,13 +1248,11 @@
             </a:endParaRPr>
           </a:p>
           <a:p>
-            <a:pPr marL="216000" indent="-216000">
-              <a:buClr>
-                <a:srgbClr val="000000"/>
-              </a:buClr>
-              <a:buSzPct val="45000"/>
-              <a:buFont typeface="Wingdings" charset="2"/>
-              <a:buChar char=""/>
+            <a:pPr>
+              <a:lnSpc>
+                <a:spcPct val="100000"/>
+              </a:lnSpc>
+              <a:buNone/>
             </a:pPr>
             <a:endParaRPr b="0" lang="en-AU" sz="2000" spc="-1" strike="noStrike">
               <a:latin typeface="Arial"/>
@@ -2337,7 +1284,7 @@
       </p:grpSpPr>
       <p:sp>
         <p:nvSpPr>
-          <p:cNvPr id="119" name="PlaceHolder 1"/>
+          <p:cNvPr id="121" name="PlaceHolder 1"/>
           <p:cNvSpPr>
             <a:spLocks noGrp="1"/>
           </p:cNvSpPr>
@@ -2348,7 +1295,7 @@
         <p:spPr>
           <a:xfrm>
             <a:off x="533520" y="764280"/>
-            <a:ext cx="6703200" cy="3769920"/>
+            <a:ext cx="6702480" cy="3769200"/>
           </a:xfrm>
           <a:prstGeom prst="rect">
             <a:avLst/>
@@ -2360,7 +1307,7 @@
       </p:sp>
       <p:sp>
         <p:nvSpPr>
-          <p:cNvPr id="120" name="PlaceHolder 2"/>
+          <p:cNvPr id="122" name="PlaceHolder 2"/>
           <p:cNvSpPr>
             <a:spLocks noGrp="1"/>
           </p:cNvSpPr>
@@ -2371,7 +1318,7 @@
         <p:spPr>
           <a:xfrm>
             <a:off x="777240" y="4777560"/>
-            <a:ext cx="6216120" cy="4532040"/>
+            <a:ext cx="6215400" cy="4531320"/>
           </a:xfrm>
           <a:prstGeom prst="rect">
             <a:avLst/>
@@ -2402,7 +1349,7 @@
                 </a:solidFill>
                 <a:latin typeface="Arial"/>
               </a:rPr>
-              <a:t>In general terms we can express price elasticity of demand algebraically as the change in quantity resulting from 1 unit change in price, </a:t>
+              <a:t>In general, the slope of the regression line is negative, indicating that as price increases, quantity demanded decreases. </a:t>
             </a:r>
             <a:endParaRPr b="0" lang="en-AU" sz="2000" spc="-1" strike="noStrike">
               <a:latin typeface="Arial"/>
@@ -2432,52 +1379,6 @@
                 <a:tab algn="l" pos="0"/>
               </a:tabLst>
             </a:pPr>
-            <a:r>
-              <a:rPr b="0" lang="en-US" sz="2000" spc="-1" strike="noStrike">
-                <a:solidFill>
-                  <a:srgbClr val="000000"/>
-                </a:solidFill>
-                <a:latin typeface="Arial"/>
-              </a:rPr>
-              <a:t>In general, the slope of the regression line is negative, indicating that as price increases, quantity demanded decreases. </a:t>
-            </a:r>
-            <a:endParaRPr b="0" lang="en-AU" sz="2000" spc="-1" strike="noStrike">
-              <a:latin typeface="Arial"/>
-            </a:endParaRPr>
-          </a:p>
-          <a:p>
-            <a:pPr marL="216000" indent="-216000">
-              <a:lnSpc>
-                <a:spcPct val="100000"/>
-              </a:lnSpc>
-              <a:buNone/>
-              <a:tabLst>
-                <a:tab algn="l" pos="0"/>
-              </a:tabLst>
-            </a:pPr>
-            <a:endParaRPr b="0" lang="en-AU" sz="2000" spc="-1" strike="noStrike">
-              <a:latin typeface="Arial"/>
-            </a:endParaRPr>
-          </a:p>
-          <a:p>
-            <a:pPr marL="216000" indent="-216000">
-              <a:lnSpc>
-                <a:spcPct val="100000"/>
-              </a:lnSpc>
-              <a:buNone/>
-              <a:tabLst>
-                <a:tab algn="l" pos="0"/>
-              </a:tabLst>
-            </a:pPr>
-            <a:r>
-              <a:rPr b="0" lang="en-US" sz="2000" spc="-1" strike="noStrike">
-                <a:solidFill>
-                  <a:srgbClr val="000000"/>
-                </a:solidFill>
-                <a:latin typeface="Arial"/>
-              </a:rPr>
-              <a:t>There are special exceptions to this, such as Giffen goods, but in our case we expect PED to be quite elastic.</a:t>
-            </a:r>
             <a:endParaRPr b="0" lang="en-AU" sz="2000" spc="-1" strike="noStrike">
               <a:latin typeface="Arial"/>
             </a:endParaRPr>
@@ -2508,7 +1409,7 @@
       </p:grpSpPr>
       <p:sp>
         <p:nvSpPr>
-          <p:cNvPr id="121" name="PlaceHolder 1"/>
+          <p:cNvPr id="123" name="PlaceHolder 1"/>
           <p:cNvSpPr>
             <a:spLocks noGrp="1"/>
           </p:cNvSpPr>
@@ -2519,7 +1420,7 @@
         <p:spPr>
           <a:xfrm>
             <a:off x="533520" y="764280"/>
-            <a:ext cx="6703200" cy="3769920"/>
+            <a:ext cx="6702480" cy="3769200"/>
           </a:xfrm>
           <a:prstGeom prst="rect">
             <a:avLst/>
@@ -2531,7 +1432,7 @@
       </p:sp>
       <p:sp>
         <p:nvSpPr>
-          <p:cNvPr id="122" name="PlaceHolder 2"/>
+          <p:cNvPr id="124" name="PlaceHolder 2"/>
           <p:cNvSpPr>
             <a:spLocks noGrp="1"/>
           </p:cNvSpPr>
@@ -2542,7 +1443,7 @@
         <p:spPr>
           <a:xfrm>
             <a:off x="777240" y="4777560"/>
-            <a:ext cx="6216120" cy="5045040"/>
+            <a:ext cx="6215400" cy="5044320"/>
           </a:xfrm>
           <a:prstGeom prst="rect">
             <a:avLst/>
@@ -2772,7 +1673,7 @@
       </p:grpSpPr>
       <p:sp>
         <p:nvSpPr>
-          <p:cNvPr id="123" name="PlaceHolder 1"/>
+          <p:cNvPr id="125" name="PlaceHolder 1"/>
           <p:cNvSpPr>
             <a:spLocks noGrp="1"/>
           </p:cNvSpPr>
@@ -2783,7 +1684,7 @@
         <p:spPr>
           <a:xfrm>
             <a:off x="533520" y="764280"/>
-            <a:ext cx="6703200" cy="3769920"/>
+            <a:ext cx="6702480" cy="3769200"/>
           </a:xfrm>
           <a:prstGeom prst="rect">
             <a:avLst/>
@@ -2795,7 +1696,7 @@
       </p:sp>
       <p:sp>
         <p:nvSpPr>
-          <p:cNvPr id="124" name="PlaceHolder 2"/>
+          <p:cNvPr id="126" name="PlaceHolder 2"/>
           <p:cNvSpPr>
             <a:spLocks noGrp="1"/>
           </p:cNvSpPr>
@@ -2806,7 +1707,7 @@
         <p:spPr>
           <a:xfrm>
             <a:off x="777240" y="4777560"/>
-            <a:ext cx="6216120" cy="4524480"/>
+            <a:ext cx="6215400" cy="4523760"/>
           </a:xfrm>
           <a:prstGeom prst="rect">
             <a:avLst/>
@@ -2924,7 +1825,7 @@
       </p:grpSpPr>
       <p:sp>
         <p:nvSpPr>
-          <p:cNvPr id="125" name="PlaceHolder 1"/>
+          <p:cNvPr id="127" name="PlaceHolder 1"/>
           <p:cNvSpPr>
             <a:spLocks noGrp="1"/>
           </p:cNvSpPr>
@@ -2935,7 +1836,7 @@
         <p:spPr>
           <a:xfrm>
             <a:off x="216360" y="812520"/>
-            <a:ext cx="7126920" cy="4008960"/>
+            <a:ext cx="7126200" cy="4008240"/>
           </a:xfrm>
           <a:prstGeom prst="rect">
             <a:avLst/>
@@ -2947,7 +1848,7 @@
       </p:sp>
       <p:sp>
         <p:nvSpPr>
-          <p:cNvPr id="126" name="PlaceHolder 2"/>
+          <p:cNvPr id="128" name="PlaceHolder 2"/>
           <p:cNvSpPr>
             <a:spLocks noGrp="1"/>
           </p:cNvSpPr>
@@ -2958,7 +1859,7 @@
         <p:spPr>
           <a:xfrm>
             <a:off x="756000" y="5078520"/>
-            <a:ext cx="6047640" cy="4811040"/>
+            <a:ext cx="6046920" cy="4810320"/>
           </a:xfrm>
           <a:prstGeom prst="rect">
             <a:avLst/>
@@ -2973,6 +1874,15 @@
             <a:noAutofit/>
           </a:bodyPr>
           <a:p>
+            <a:pPr marL="216000" indent="-216000">
+              <a:lnSpc>
+                <a:spcPct val="100000"/>
+              </a:lnSpc>
+              <a:buNone/>
+              <a:tabLst>
+                <a:tab algn="l" pos="0"/>
+              </a:tabLst>
+            </a:pPr>
             <a:r>
               <a:rPr b="0" lang="en-AU" sz="2000" spc="-1" strike="noStrike">
                 <a:latin typeface="Arial"/>
@@ -2985,12 +1895,18 @@
           </a:p>
           <a:p>
             <a:pPr marL="216000" indent="-216000">
+              <a:lnSpc>
+                <a:spcPct val="100000"/>
+              </a:lnSpc>
               <a:buClr>
                 <a:srgbClr val="000000"/>
               </a:buClr>
               <a:buSzPct val="45000"/>
               <a:buFont typeface="Wingdings" charset="2"/>
               <a:buChar char=""/>
+              <a:tabLst>
+                <a:tab algn="l" pos="0"/>
+              </a:tabLst>
             </a:pPr>
             <a:r>
               <a:rPr b="0" lang="en-AU" sz="2000" spc="-1" strike="noStrike">
@@ -3004,12 +1920,18 @@
           </a:p>
           <a:p>
             <a:pPr marL="216000" indent="-216000">
+              <a:lnSpc>
+                <a:spcPct val="100000"/>
+              </a:lnSpc>
               <a:buClr>
                 <a:srgbClr val="000000"/>
               </a:buClr>
               <a:buSzPct val="45000"/>
               <a:buFont typeface="Wingdings" charset="2"/>
               <a:buChar char=""/>
+              <a:tabLst>
+                <a:tab algn="l" pos="0"/>
+              </a:tabLst>
             </a:pPr>
             <a:r>
               <a:rPr b="0" lang="en-AU" sz="2000" spc="-1" strike="noStrike">
@@ -3023,12 +1945,18 @@
           </a:p>
           <a:p>
             <a:pPr marL="216000" indent="-216000">
+              <a:lnSpc>
+                <a:spcPct val="100000"/>
+              </a:lnSpc>
               <a:buClr>
                 <a:srgbClr val="000000"/>
               </a:buClr>
               <a:buSzPct val="45000"/>
               <a:buFont typeface="Wingdings" charset="2"/>
               <a:buChar char=""/>
+              <a:tabLst>
+                <a:tab algn="l" pos="0"/>
+              </a:tabLst>
             </a:pPr>
             <a:r>
               <a:rPr b="0" lang="en-AU" sz="2000" spc="-1" strike="noStrike">
@@ -3041,13 +1969,53 @@
             </a:endParaRPr>
           </a:p>
           <a:p>
+            <a:pPr>
+              <a:lnSpc>
+                <a:spcPct val="100000"/>
+              </a:lnSpc>
+              <a:buNone/>
+              <a:tabLst>
+                <a:tab algn="l" pos="0"/>
+              </a:tabLst>
+            </a:pPr>
+            <a:endParaRPr b="0" lang="en-AU" sz="2000" spc="-1" strike="noStrike">
+              <a:latin typeface="Arial"/>
+            </a:endParaRPr>
+          </a:p>
+          <a:p>
             <a:pPr marL="216000" indent="-216000">
+              <a:lnSpc>
+                <a:spcPct val="100000"/>
+              </a:lnSpc>
               <a:buClr>
                 <a:srgbClr val="000000"/>
               </a:buClr>
               <a:buSzPct val="45000"/>
               <a:buFont typeface="Wingdings" charset="2"/>
               <a:buChar char=""/>
+              <a:tabLst>
+                <a:tab algn="l" pos="0"/>
+              </a:tabLst>
+            </a:pPr>
+            <a:r>
+              <a:rPr b="0" lang="en-AU" sz="2000" spc="-1" strike="noStrike">
+                <a:latin typeface="Arial"/>
+              </a:rPr>
+              <a:t>Thus we’ve achieved our objective of increasing gross profit by optimising price.</a:t>
+            </a:r>
+            <a:endParaRPr b="0" lang="en-AU" sz="2000" spc="-1" strike="noStrike">
+              <a:latin typeface="Arial"/>
+            </a:endParaRPr>
+          </a:p>
+          <a:p>
+            <a:pPr>
+              <a:lnSpc>
+                <a:spcPct val="100000"/>
+              </a:lnSpc>
+              <a:buNone/>
+              <a:tabLst>
+                <a:tab algn="l" pos="0"/>
+              </a:tabLst>
             </a:pPr>
             <a:endParaRPr b="0" lang="en-AU" sz="2000" spc="-1" strike="noStrike">
               <a:latin typeface="Arial"/>
@@ -3055,44 +2023,18 @@
           </a:p>
           <a:p>
             <a:pPr marL="216000" indent="-216000">
+              <a:lnSpc>
+                <a:spcPct val="100000"/>
+              </a:lnSpc>
               <a:buClr>
                 <a:srgbClr val="000000"/>
               </a:buClr>
               <a:buSzPct val="45000"/>
               <a:buFont typeface="Wingdings" charset="2"/>
               <a:buChar char=""/>
-            </a:pPr>
-            <a:r>
-              <a:rPr b="0" lang="en-AU" sz="2000" spc="-1" strike="noStrike">
-                <a:latin typeface="Arial"/>
-              </a:rPr>
-              <a:t>Thus we’ve achieved our objective of increasing gross profit by optimising price.</a:t>
-            </a:r>
-            <a:endParaRPr b="0" lang="en-AU" sz="2000" spc="-1" strike="noStrike">
-              <a:latin typeface="Arial"/>
-            </a:endParaRPr>
-          </a:p>
-          <a:p>
-            <a:pPr marL="216000" indent="-216000">
-              <a:buClr>
-                <a:srgbClr val="000000"/>
-              </a:buClr>
-              <a:buSzPct val="45000"/>
-              <a:buFont typeface="Wingdings" charset="2"/>
-              <a:buChar char=""/>
-            </a:pPr>
-            <a:endParaRPr b="0" lang="en-AU" sz="2000" spc="-1" strike="noStrike">
-              <a:latin typeface="Arial"/>
-            </a:endParaRPr>
-          </a:p>
-          <a:p>
-            <a:pPr marL="216000" indent="-216000">
-              <a:buClr>
-                <a:srgbClr val="000000"/>
-              </a:buClr>
-              <a:buSzPct val="45000"/>
-              <a:buFont typeface="Wingdings" charset="2"/>
-              <a:buChar char=""/>
+              <a:tabLst>
+                <a:tab algn="l" pos="0"/>
+              </a:tabLst>
             </a:pPr>
             <a:r>
               <a:rPr b="0" lang="en-AU" sz="2000" spc="-1" strike="noStrike">
@@ -3162,7 +2104,7 @@
         <p:txBody>
           <a:bodyPr/>
           <a:p>
-            <a:fld id="{ABF5C769-42C4-44FD-932B-F2B9B473BE53}" type="slidenum">
+            <a:fld id="{0075E9CA-E0F6-43D8-9616-9ABF69999A7C}" type="slidenum">
               <a:t>&lt;#&gt;</a:t>
             </a:fld>
           </a:p>
@@ -3350,7 +2292,7 @@
         <p:txBody>
           <a:bodyPr/>
           <a:p>
-            <a:fld id="{D31C2F14-5DEE-4E23-941F-AC028CA28129}" type="slidenum">
+            <a:fld id="{076C50B7-65EE-40BE-BC51-B858CFBD671D}" type="slidenum">
               <a:t>&lt;#&gt;</a:t>
             </a:fld>
           </a:p>
@@ -3606,7 +2548,7 @@
         <p:txBody>
           <a:bodyPr/>
           <a:p>
-            <a:fld id="{B822F81A-0C05-43CD-8B0D-DCA5EC9BF3C4}" type="slidenum">
+            <a:fld id="{584D6811-D19B-4078-BA3C-9E2E2531031B}" type="slidenum">
               <a:t>&lt;#&gt;</a:t>
             </a:fld>
           </a:p>
@@ -3930,7 +2872,7 @@
         <p:txBody>
           <a:bodyPr/>
           <a:p>
-            <a:fld id="{DB5A4FB9-88D7-4729-92A7-0144E706F416}" type="slidenum">
+            <a:fld id="{B1573F8A-4D03-41CF-9236-7FAE193DAFB0}" type="slidenum">
               <a:t>&lt;#&gt;</a:t>
             </a:fld>
           </a:p>
@@ -4013,7 +2955,7 @@
         <p:txBody>
           <a:bodyPr/>
           <a:p>
-            <a:fld id="{A872B69F-B06A-4B78-9CE3-A6D3DB7469B1}" type="slidenum">
+            <a:fld id="{9CA08B65-436B-489E-92ED-1482FD25815C}" type="slidenum">
               <a:t>&lt;#&gt;</a:t>
             </a:fld>
           </a:p>
@@ -4170,7 +3112,7 @@
         <p:txBody>
           <a:bodyPr/>
           <a:p>
-            <a:fld id="{DCE62CB8-8954-4306-B1F0-45BCA3CCAA31}" type="slidenum">
+            <a:fld id="{1895E4D9-717D-426C-8B82-A19CCF8AD129}" type="slidenum">
               <a:t>&lt;#&gt;</a:t>
             </a:fld>
           </a:p>
@@ -4324,7 +3266,7 @@
         <p:txBody>
           <a:bodyPr/>
           <a:p>
-            <a:fld id="{D864A991-F8DB-4CCC-85D5-A91157E99000}" type="slidenum">
+            <a:fld id="{611EB19E-687B-43D7-9E41-4738898BA542}" type="slidenum">
               <a:t>&lt;#&gt;</a:t>
             </a:fld>
           </a:p>
@@ -4512,7 +3454,7 @@
         <p:txBody>
           <a:bodyPr/>
           <a:p>
-            <a:fld id="{2DBF8F36-23B3-4424-A7D3-59C34FEF579E}" type="slidenum">
+            <a:fld id="{1B0F59C5-DE7D-42DF-B16A-F05279496D6F}" type="slidenum">
               <a:t>&lt;#&gt;</a:t>
             </a:fld>
           </a:p>
@@ -4632,7 +3574,7 @@
         <p:txBody>
           <a:bodyPr/>
           <a:p>
-            <a:fld id="{9A4A36AF-A868-4093-8344-62E63BD80361}" type="slidenum">
+            <a:fld id="{9DAA3790-F4F1-4913-81A7-4E60A93562F3}" type="slidenum">
               <a:t>&lt;#&gt;</a:t>
             </a:fld>
           </a:p>
@@ -4752,7 +3694,7 @@
         <p:txBody>
           <a:bodyPr/>
           <a:p>
-            <a:fld id="{26820367-71FA-4A31-89BF-96032E8B5AB7}" type="slidenum">
+            <a:fld id="{D92FBE5C-DB73-4AB8-BCCB-10939F52E6D9}" type="slidenum">
               <a:t>&lt;#&gt;</a:t>
             </a:fld>
           </a:p>
@@ -4974,7 +3916,7 @@
         <p:txBody>
           <a:bodyPr/>
           <a:p>
-            <a:fld id="{F01DFC8B-C3C2-4E53-A590-3424BE3D8855}" type="slidenum">
+            <a:fld id="{2CFB4101-F230-4950-9D93-035F584A1E31}" type="slidenum">
               <a:t>&lt;#&gt;</a:t>
             </a:fld>
           </a:p>
@@ -5131,7 +4073,7 @@
         <p:txBody>
           <a:bodyPr/>
           <a:p>
-            <a:fld id="{2C0AE784-5174-43BA-8EBB-25F0398D6A50}" type="slidenum">
+            <a:fld id="{32C097FD-BC0B-40D5-BE7F-21F76F4FBB50}" type="slidenum">
               <a:t>&lt;#&gt;</a:t>
             </a:fld>
           </a:p>
@@ -5353,7 +4295,7 @@
         <p:txBody>
           <a:bodyPr/>
           <a:p>
-            <a:fld id="{DA2B2FDD-2F6E-4D94-984D-C53A030525AC}" type="slidenum">
+            <a:fld id="{D3C621C0-D487-4671-B679-499BF903841F}" type="slidenum">
               <a:t>&lt;#&gt;</a:t>
             </a:fld>
           </a:p>
@@ -5575,7 +4517,7 @@
         <p:txBody>
           <a:bodyPr/>
           <a:p>
-            <a:fld id="{E4B35E1D-C887-4C3B-985C-610F49487B19}" type="slidenum">
+            <a:fld id="{ACCC38AF-963D-4ABF-9948-755CD481C801}" type="slidenum">
               <a:t>&lt;#&gt;</a:t>
             </a:fld>
           </a:p>
@@ -5763,7 +4705,7 @@
         <p:txBody>
           <a:bodyPr/>
           <a:p>
-            <a:fld id="{23D69CCD-C792-4C00-8B27-95B7600514FA}" type="slidenum">
+            <a:fld id="{7E69D843-33AB-473F-B428-403ED6A7E56F}" type="slidenum">
               <a:t>&lt;#&gt;</a:t>
             </a:fld>
           </a:p>
@@ -6019,7 +4961,7 @@
         <p:txBody>
           <a:bodyPr/>
           <a:p>
-            <a:fld id="{98CA0018-451F-47AE-94B8-63A81DD38EDF}" type="slidenum">
+            <a:fld id="{47386D78-BCF7-4862-8CB3-C6E1B269D5B0}" type="slidenum">
               <a:t>&lt;#&gt;</a:t>
             </a:fld>
           </a:p>
@@ -6343,7 +5285,7 @@
         <p:txBody>
           <a:bodyPr/>
           <a:p>
-            <a:fld id="{14686E63-0468-4727-9B45-4D116F12F277}" type="slidenum">
+            <a:fld id="{E2DEB3C3-06C7-4557-8655-A6F6FC8CA687}" type="slidenum">
               <a:t>&lt;#&gt;</a:t>
             </a:fld>
           </a:p>
@@ -6497,7 +5439,7 @@
         <p:txBody>
           <a:bodyPr/>
           <a:p>
-            <a:fld id="{A5483BFB-7AA5-4EBA-8AA0-EB025B60879A}" type="slidenum">
+            <a:fld id="{B3E7CC0C-A3BD-4037-987B-7A85B15C2C96}" type="slidenum">
               <a:t>&lt;#&gt;</a:t>
             </a:fld>
           </a:p>
@@ -6685,7 +5627,7 @@
         <p:txBody>
           <a:bodyPr/>
           <a:p>
-            <a:fld id="{A635631B-FBA1-4C2E-AA46-E21528489C67}" type="slidenum">
+            <a:fld id="{796E572F-F42F-4842-B2C2-ED207333331A}" type="slidenum">
               <a:t>&lt;#&gt;</a:t>
             </a:fld>
           </a:p>
@@ -6805,7 +5747,7 @@
         <p:txBody>
           <a:bodyPr/>
           <a:p>
-            <a:fld id="{7555AD40-BC1D-4F4F-9C6C-EAB14BDDA594}" type="slidenum">
+            <a:fld id="{9B27883E-CAE9-4266-B2F6-C76DCA3A5C30}" type="slidenum">
               <a:t>&lt;#&gt;</a:t>
             </a:fld>
           </a:p>
@@ -6925,7 +5867,7 @@
         <p:txBody>
           <a:bodyPr/>
           <a:p>
-            <a:fld id="{AD7DB70E-8544-427F-B90E-03ED875D7D6D}" type="slidenum">
+            <a:fld id="{5B2A8223-5C95-4631-9856-6A0950AD47A8}" type="slidenum">
               <a:t>&lt;#&gt;</a:t>
             </a:fld>
           </a:p>
@@ -7147,7 +6089,7 @@
         <p:txBody>
           <a:bodyPr/>
           <a:p>
-            <a:fld id="{115CD2DB-F2A3-485C-8E1C-041EAC0B8313}" type="slidenum">
+            <a:fld id="{F6BECC37-9F55-4360-9241-ED3D46FC4061}" type="slidenum">
               <a:t>&lt;#&gt;</a:t>
             </a:fld>
           </a:p>
@@ -7369,7 +6311,7 @@
         <p:txBody>
           <a:bodyPr/>
           <a:p>
-            <a:fld id="{C6C9EB0C-493B-43A2-8548-5A446C75755B}" type="slidenum">
+            <a:fld id="{838DB032-6583-44B4-BA4F-9BD689A9AE1F}" type="slidenum">
               <a:t>&lt;#&gt;</a:t>
             </a:fld>
           </a:p>
@@ -7591,7 +6533,7 @@
         <p:txBody>
           <a:bodyPr/>
           <a:p>
-            <a:fld id="{AB1E4328-2921-409C-BBFB-299F44D59CEB}" type="slidenum">
+            <a:fld id="{C9067EEF-08F1-48FC-BBF5-A0C7BD1C03D4}" type="slidenum">
               <a:t>&lt;#&gt;</a:t>
             </a:fld>
           </a:p>
@@ -7647,236 +6589,13 @@
             <a:spLocks noGrp="1"/>
           </p:cNvSpPr>
           <p:nvPr>
-            <p:ph type="title"/>
-          </p:nvPr>
-        </p:nvSpPr>
-        <p:spPr>
-          <a:xfrm>
-            <a:off x="504000" y="226080"/>
-            <a:ext cx="9070200" cy="945000"/>
-          </a:xfrm>
-          <a:prstGeom prst="rect">
-            <a:avLst/>
-          </a:prstGeom>
-          <a:noFill/>
-          <a:ln w="0">
-            <a:noFill/>
-          </a:ln>
-        </p:spPr>
-        <p:txBody>
-          <a:bodyPr lIns="0" rIns="0" tIns="0" bIns="0" anchor="ctr">
-            <a:noAutofit/>
-          </a:bodyPr>
-          <a:p>
-            <a:r>
-              <a:rPr b="0" lang="en-AU" sz="1800" spc="-1" strike="noStrike">
-                <a:latin typeface="Arial"/>
-              </a:rPr>
-              <a:t>Click to edit the title text format</a:t>
-            </a:r>
-            <a:endParaRPr b="0" lang="en-AU" sz="1800" spc="-1" strike="noStrike">
-              <a:latin typeface="Arial"/>
-            </a:endParaRPr>
-          </a:p>
-        </p:txBody>
-      </p:sp>
-      <p:sp>
-        <p:nvSpPr>
-          <p:cNvPr id="1" name="PlaceHolder 2"/>
-          <p:cNvSpPr>
-            <a:spLocks noGrp="1"/>
-          </p:cNvSpPr>
-          <p:nvPr>
-            <p:ph type="body"/>
-          </p:nvPr>
-        </p:nvSpPr>
-        <p:spPr>
-          <a:xfrm>
-            <a:off x="504000" y="1326600"/>
-            <a:ext cx="9070200" cy="3286800"/>
-          </a:xfrm>
-          <a:prstGeom prst="rect">
-            <a:avLst/>
-          </a:prstGeom>
-          <a:noFill/>
-          <a:ln w="0">
-            <a:noFill/>
-          </a:ln>
-        </p:spPr>
-        <p:txBody>
-          <a:bodyPr lIns="0" rIns="0" tIns="0" bIns="0" anchor="t">
-            <a:normAutofit/>
-          </a:bodyPr>
-          <a:p>
-            <a:pPr marL="432000" indent="-324000">
-              <a:spcBef>
-                <a:spcPts val="1417"/>
-              </a:spcBef>
-              <a:buClr>
-                <a:srgbClr val="000000"/>
-              </a:buClr>
-              <a:buSzPct val="45000"/>
-              <a:buFont typeface="Wingdings" charset="2"/>
-              <a:buChar char=""/>
-            </a:pPr>
-            <a:r>
-              <a:rPr b="0" lang="en-AU" sz="1800" spc="-1" strike="noStrike">
-                <a:latin typeface="Arial"/>
-              </a:rPr>
-              <a:t>Click to edit the outline text format</a:t>
-            </a:r>
-            <a:endParaRPr b="0" lang="en-AU" sz="1800" spc="-1" strike="noStrike">
-              <a:latin typeface="Arial"/>
-            </a:endParaRPr>
-          </a:p>
-          <a:p>
-            <a:pPr lvl="1" marL="864000" indent="-324000">
-              <a:spcBef>
-                <a:spcPts val="1134"/>
-              </a:spcBef>
-              <a:buClr>
-                <a:srgbClr val="000000"/>
-              </a:buClr>
-              <a:buSzPct val="75000"/>
-              <a:buFont typeface="Symbol" charset="2"/>
-              <a:buChar char=""/>
-            </a:pPr>
-            <a:r>
-              <a:rPr b="0" lang="en-AU" sz="1800" spc="-1" strike="noStrike">
-                <a:latin typeface="Arial"/>
-              </a:rPr>
-              <a:t>Second Outline Level</a:t>
-            </a:r>
-            <a:endParaRPr b="0" lang="en-AU" sz="1800" spc="-1" strike="noStrike">
-              <a:latin typeface="Arial"/>
-            </a:endParaRPr>
-          </a:p>
-          <a:p>
-            <a:pPr lvl="2" marL="1296000" indent="-288000">
-              <a:spcBef>
-                <a:spcPts val="850"/>
-              </a:spcBef>
-              <a:buClr>
-                <a:srgbClr val="000000"/>
-              </a:buClr>
-              <a:buSzPct val="45000"/>
-              <a:buFont typeface="Wingdings" charset="2"/>
-              <a:buChar char=""/>
-            </a:pPr>
-            <a:r>
-              <a:rPr b="0" lang="en-AU" sz="1800" spc="-1" strike="noStrike">
-                <a:latin typeface="Arial"/>
-              </a:rPr>
-              <a:t>Third Outline Level</a:t>
-            </a:r>
-            <a:endParaRPr b="0" lang="en-AU" sz="1800" spc="-1" strike="noStrike">
-              <a:latin typeface="Arial"/>
-            </a:endParaRPr>
-          </a:p>
-          <a:p>
-            <a:pPr lvl="3" marL="1728000" indent="-216000">
-              <a:spcBef>
-                <a:spcPts val="567"/>
-              </a:spcBef>
-              <a:buClr>
-                <a:srgbClr val="000000"/>
-              </a:buClr>
-              <a:buSzPct val="75000"/>
-              <a:buFont typeface="Symbol" charset="2"/>
-              <a:buChar char=""/>
-            </a:pPr>
-            <a:r>
-              <a:rPr b="0" lang="en-AU" sz="1800" spc="-1" strike="noStrike">
-                <a:latin typeface="Arial"/>
-              </a:rPr>
-              <a:t>Fourth Outline Level</a:t>
-            </a:r>
-            <a:endParaRPr b="0" lang="en-AU" sz="1800" spc="-1" strike="noStrike">
-              <a:latin typeface="Arial"/>
-            </a:endParaRPr>
-          </a:p>
-          <a:p>
-            <a:pPr lvl="4" marL="2160000" indent="-216000">
-              <a:spcBef>
-                <a:spcPts val="283"/>
-              </a:spcBef>
-              <a:buClr>
-                <a:srgbClr val="000000"/>
-              </a:buClr>
-              <a:buSzPct val="45000"/>
-              <a:buFont typeface="Wingdings" charset="2"/>
-              <a:buChar char=""/>
-            </a:pPr>
-            <a:r>
-              <a:rPr b="0" lang="en-AU" sz="1800" spc="-1" strike="noStrike">
-                <a:latin typeface="Arial"/>
-              </a:rPr>
-              <a:t>Fifth Outline Level</a:t>
-            </a:r>
-            <a:endParaRPr b="0" lang="en-AU" sz="1800" spc="-1" strike="noStrike">
-              <a:latin typeface="Arial"/>
-            </a:endParaRPr>
-          </a:p>
-          <a:p>
-            <a:pPr lvl="5" marL="2592000" indent="-216000">
-              <a:spcBef>
-                <a:spcPts val="283"/>
-              </a:spcBef>
-              <a:buClr>
-                <a:srgbClr val="000000"/>
-              </a:buClr>
-              <a:buSzPct val="45000"/>
-              <a:buFont typeface="Wingdings" charset="2"/>
-              <a:buChar char=""/>
-            </a:pPr>
-            <a:r>
-              <a:rPr b="0" lang="en-AU" sz="1800" spc="-1" strike="noStrike">
-                <a:latin typeface="Arial"/>
-              </a:rPr>
-              <a:t>Sixth Outline Level</a:t>
-            </a:r>
-            <a:endParaRPr b="0" lang="en-AU" sz="1800" spc="-1" strike="noStrike">
-              <a:latin typeface="Arial"/>
-            </a:endParaRPr>
-          </a:p>
-          <a:p>
-            <a:pPr lvl="6" marL="3024000" indent="-216000">
-              <a:spcBef>
-                <a:spcPts val="283"/>
-              </a:spcBef>
-              <a:buClr>
-                <a:srgbClr val="000000"/>
-              </a:buClr>
-              <a:buSzPct val="45000"/>
-              <a:buFont typeface="Wingdings" charset="2"/>
-              <a:buChar char=""/>
-            </a:pPr>
-            <a:r>
-              <a:rPr b="0" lang="en-AU" sz="1800" spc="-1" strike="noStrike">
-                <a:latin typeface="Arial"/>
-              </a:rPr>
-              <a:t>Seventh Outline Level</a:t>
-            </a:r>
-            <a:endParaRPr b="0" lang="en-AU" sz="1800" spc="-1" strike="noStrike">
-              <a:latin typeface="Arial"/>
-            </a:endParaRPr>
-          </a:p>
-        </p:txBody>
-      </p:sp>
-      <p:sp>
-        <p:nvSpPr>
-          <p:cNvPr id="2" name="PlaceHolder 3"/>
-          <p:cNvSpPr>
-            <a:spLocks noGrp="1"/>
-          </p:cNvSpPr>
-          <p:nvPr>
             <p:ph type="ftr" idx="1"/>
           </p:nvPr>
         </p:nvSpPr>
         <p:spPr>
           <a:xfrm>
             <a:off x="3447360" y="5165280"/>
-            <a:ext cx="3193560" cy="389160"/>
+            <a:ext cx="3192840" cy="388440"/>
           </a:xfrm>
           <a:prstGeom prst="rect">
             <a:avLst/>
@@ -7934,7 +6653,7 @@
       </p:sp>
       <p:sp>
         <p:nvSpPr>
-          <p:cNvPr id="3" name="PlaceHolder 4"/>
+          <p:cNvPr id="1" name="PlaceHolder 2"/>
           <p:cNvSpPr>
             <a:spLocks noGrp="1"/>
           </p:cNvSpPr>
@@ -7945,7 +6664,7 @@
         <p:spPr>
           <a:xfrm>
             <a:off x="7227360" y="5165280"/>
-            <a:ext cx="2346840" cy="389160"/>
+            <a:ext cx="2346120" cy="388440"/>
           </a:xfrm>
           <a:prstGeom prst="rect">
             <a:avLst/>
@@ -7986,7 +6705,7 @@
                 <a:tab algn="l" pos="0"/>
               </a:tabLst>
             </a:pPr>
-            <a:fld id="{86D28A67-73CF-4686-AAB3-F11E48C4BFB1}" type="slidenum">
+            <a:fld id="{D5607AC4-0CC4-4287-A724-D4595AD39A58}" type="slidenum">
               <a:rPr b="0" lang="en-US" sz="1400" spc="-1" strike="noStrike">
                 <a:solidFill>
                   <a:srgbClr val="000000"/>
@@ -8003,7 +6722,7 @@
       </p:sp>
       <p:sp>
         <p:nvSpPr>
-          <p:cNvPr id="4" name="PlaceHolder 5"/>
+          <p:cNvPr id="2" name="PlaceHolder 3"/>
           <p:cNvSpPr>
             <a:spLocks noGrp="1"/>
           </p:cNvSpPr>
@@ -8014,7 +6733,7 @@
         <p:spPr>
           <a:xfrm>
             <a:off x="504000" y="5165280"/>
-            <a:ext cx="2346840" cy="389160"/>
+            <a:ext cx="2346120" cy="388440"/>
           </a:xfrm>
           <a:prstGeom prst="rect">
             <a:avLst/>
@@ -8044,6 +6763,232 @@
             </a:r>
             <a:endParaRPr b="0" lang="en-AU" sz="1400" spc="-1" strike="noStrike">
               <a:latin typeface="Times New Roman"/>
+            </a:endParaRPr>
+          </a:p>
+        </p:txBody>
+      </p:sp>
+      <p:sp>
+        <p:nvSpPr>
+          <p:cNvPr id="3" name="PlaceHolder 4"/>
+          <p:cNvSpPr>
+            <a:spLocks noGrp="1"/>
+          </p:cNvSpPr>
+          <p:nvPr>
+            <p:ph type="title"/>
+          </p:nvPr>
+        </p:nvSpPr>
+        <p:spPr>
+          <a:xfrm>
+            <a:off x="504000" y="226080"/>
+            <a:ext cx="9072000" cy="946440"/>
+          </a:xfrm>
+          <a:prstGeom prst="rect">
+            <a:avLst/>
+          </a:prstGeom>
+          <a:noFill/>
+          <a:ln w="0">
+            <a:noFill/>
+          </a:ln>
+        </p:spPr>
+        <p:txBody>
+          <a:bodyPr lIns="0" rIns="0" tIns="0" bIns="0" anchor="ctr">
+            <a:noAutofit/>
+          </a:bodyPr>
+          <a:p>
+            <a:pPr algn="ctr">
+              <a:buNone/>
+            </a:pPr>
+            <a:r>
+              <a:rPr b="0" lang="en-AU" sz="4400" spc="-1" strike="noStrike">
+                <a:latin typeface="Arial"/>
+              </a:rPr>
+              <a:t>Click to edit the title text format</a:t>
+            </a:r>
+            <a:endParaRPr b="0" lang="en-AU" sz="4400" spc="-1" strike="noStrike">
+              <a:latin typeface="Arial"/>
+            </a:endParaRPr>
+          </a:p>
+        </p:txBody>
+      </p:sp>
+      <p:sp>
+        <p:nvSpPr>
+          <p:cNvPr id="4" name="PlaceHolder 5"/>
+          <p:cNvSpPr>
+            <a:spLocks noGrp="1"/>
+          </p:cNvSpPr>
+          <p:nvPr>
+            <p:ph type="body"/>
+          </p:nvPr>
+        </p:nvSpPr>
+        <p:spPr>
+          <a:xfrm>
+            <a:off x="504000" y="1326600"/>
+            <a:ext cx="9072000" cy="3288600"/>
+          </a:xfrm>
+          <a:prstGeom prst="rect">
+            <a:avLst/>
+          </a:prstGeom>
+          <a:noFill/>
+          <a:ln w="0">
+            <a:noFill/>
+          </a:ln>
+        </p:spPr>
+        <p:txBody>
+          <a:bodyPr lIns="0" rIns="0" tIns="0" bIns="0" anchor="t">
+            <a:normAutofit/>
+          </a:bodyPr>
+          <a:p>
+            <a:pPr marL="432000" indent="-324000">
+              <a:spcBef>
+                <a:spcPts val="1417"/>
+              </a:spcBef>
+              <a:buClr>
+                <a:srgbClr val="000000"/>
+              </a:buClr>
+              <a:buSzPct val="45000"/>
+              <a:buFont typeface="Wingdings" charset="2"/>
+              <a:buChar char=""/>
+            </a:pPr>
+            <a:r>
+              <a:rPr b="0" lang="en-AU" sz="3200" spc="-1" strike="noStrike">
+                <a:latin typeface="Arial"/>
+              </a:rPr>
+              <a:t>Click to edit the outline text format</a:t>
+            </a:r>
+            <a:endParaRPr b="0" lang="en-AU" sz="3200" spc="-1" strike="noStrike">
+              <a:latin typeface="Arial"/>
+            </a:endParaRPr>
+          </a:p>
+          <a:p>
+            <a:pPr lvl="1" marL="864000" indent="-324000">
+              <a:spcBef>
+                <a:spcPts val="1134"/>
+              </a:spcBef>
+              <a:buClr>
+                <a:srgbClr val="000000"/>
+              </a:buClr>
+              <a:buSzPct val="75000"/>
+              <a:buFont typeface="Symbol" charset="2"/>
+              <a:buChar char=""/>
+            </a:pPr>
+            <a:r>
+              <a:rPr b="0" lang="en-AU" sz="2800" spc="-1" strike="noStrike">
+                <a:latin typeface="Arial"/>
+              </a:rPr>
+              <a:t>Second Outline Level</a:t>
+            </a:r>
+            <a:endParaRPr b="0" lang="en-AU" sz="2800" spc="-1" strike="noStrike">
+              <a:latin typeface="Arial"/>
+            </a:endParaRPr>
+          </a:p>
+          <a:p>
+            <a:pPr lvl="2" marL="1296000" indent="-288000">
+              <a:spcBef>
+                <a:spcPts val="850"/>
+              </a:spcBef>
+              <a:buClr>
+                <a:srgbClr val="000000"/>
+              </a:buClr>
+              <a:buSzPct val="45000"/>
+              <a:buFont typeface="Wingdings" charset="2"/>
+              <a:buChar char=""/>
+            </a:pPr>
+            <a:r>
+              <a:rPr b="0" lang="en-AU" sz="2400" spc="-1" strike="noStrike">
+                <a:latin typeface="Arial"/>
+              </a:rPr>
+              <a:t>Third Outline Level</a:t>
+            </a:r>
+            <a:endParaRPr b="0" lang="en-AU" sz="2400" spc="-1" strike="noStrike">
+              <a:latin typeface="Arial"/>
+            </a:endParaRPr>
+          </a:p>
+          <a:p>
+            <a:pPr lvl="3" marL="1728000" indent="-216000">
+              <a:spcBef>
+                <a:spcPts val="567"/>
+              </a:spcBef>
+              <a:buClr>
+                <a:srgbClr val="000000"/>
+              </a:buClr>
+              <a:buSzPct val="75000"/>
+              <a:buFont typeface="Symbol" charset="2"/>
+              <a:buChar char=""/>
+            </a:pPr>
+            <a:r>
+              <a:rPr b="0" lang="en-AU" sz="2000" spc="-1" strike="noStrike">
+                <a:latin typeface="Arial"/>
+              </a:rPr>
+              <a:t>Fourth Outline Level</a:t>
+            </a:r>
+            <a:endParaRPr b="0" lang="en-AU" sz="2000" spc="-1" strike="noStrike">
+              <a:latin typeface="Arial"/>
+            </a:endParaRPr>
+          </a:p>
+          <a:p>
+            <a:pPr lvl="4" marL="2160000" indent="-216000">
+              <a:spcBef>
+                <a:spcPts val="283"/>
+              </a:spcBef>
+              <a:buClr>
+                <a:srgbClr val="000000"/>
+              </a:buClr>
+              <a:buSzPct val="45000"/>
+              <a:buFont typeface="Wingdings" charset="2"/>
+              <a:buChar char=""/>
+            </a:pPr>
+            <a:r>
+              <a:rPr b="0" lang="en-AU" sz="2000" spc="-1" strike="noStrike">
+                <a:latin typeface="Arial"/>
+              </a:rPr>
+              <a:t>Fifth Outline Level</a:t>
+            </a:r>
+            <a:endParaRPr b="0" lang="en-AU" sz="2000" spc="-1" strike="noStrike">
+              <a:latin typeface="Arial"/>
+            </a:endParaRPr>
+          </a:p>
+          <a:p>
+            <a:pPr lvl="5" marL="2592000" indent="-216000">
+              <a:spcBef>
+                <a:spcPts val="283"/>
+              </a:spcBef>
+              <a:buClr>
+                <a:srgbClr val="000000"/>
+              </a:buClr>
+              <a:buSzPct val="45000"/>
+              <a:buFont typeface="Wingdings" charset="2"/>
+              <a:buChar char=""/>
+            </a:pPr>
+            <a:r>
+              <a:rPr b="0" lang="en-AU" sz="2000" spc="-1" strike="noStrike">
+                <a:latin typeface="Arial"/>
+              </a:rPr>
+              <a:t>Sixth Outline Level</a:t>
+            </a:r>
+            <a:endParaRPr b="0" lang="en-AU" sz="2000" spc="-1" strike="noStrike">
+              <a:latin typeface="Arial"/>
+            </a:endParaRPr>
+          </a:p>
+          <a:p>
+            <a:pPr lvl="6" marL="3024000" indent="-216000">
+              <a:spcBef>
+                <a:spcPts val="283"/>
+              </a:spcBef>
+              <a:buClr>
+                <a:srgbClr val="000000"/>
+              </a:buClr>
+              <a:buSzPct val="45000"/>
+              <a:buFont typeface="Wingdings" charset="2"/>
+              <a:buChar char=""/>
+            </a:pPr>
+            <a:r>
+              <a:rPr b="0" lang="en-AU" sz="2000" spc="-1" strike="noStrike">
+                <a:latin typeface="Arial"/>
+              </a:rPr>
+              <a:t>Seventh Outline Level</a:t>
+            </a:r>
+            <a:endParaRPr b="0" lang="en-AU" sz="2000" spc="-1" strike="noStrike">
+              <a:latin typeface="Arial"/>
             </a:endParaRPr>
           </a:p>
         </p:txBody>
@@ -8098,7 +7043,7 @@
         <p:spPr>
           <a:xfrm>
             <a:off x="3447360" y="5165280"/>
-            <a:ext cx="3193560" cy="389160"/>
+            <a:ext cx="3192840" cy="388440"/>
           </a:xfrm>
           <a:prstGeom prst="rect">
             <a:avLst/>
@@ -8167,7 +7112,7 @@
         <p:spPr>
           <a:xfrm>
             <a:off x="7227360" y="5165280"/>
-            <a:ext cx="2346840" cy="389160"/>
+            <a:ext cx="2346120" cy="388440"/>
           </a:xfrm>
           <a:prstGeom prst="rect">
             <a:avLst/>
@@ -8208,7 +7153,7 @@
                 <a:tab algn="l" pos="0"/>
               </a:tabLst>
             </a:pPr>
-            <a:fld id="{02F15EF3-2CD1-46E1-8D07-44C0F32F6585}" type="slidenum">
+            <a:fld id="{6A87F0D5-8928-4C7F-930E-32630F123276}" type="slidenum">
               <a:rPr b="0" lang="en-US" sz="1400" spc="-1" strike="noStrike">
                 <a:solidFill>
                   <a:srgbClr val="000000"/>
@@ -8236,7 +7181,7 @@
         <p:spPr>
           <a:xfrm>
             <a:off x="504000" y="5165280"/>
-            <a:ext cx="2346840" cy="389160"/>
+            <a:ext cx="2346120" cy="388440"/>
           </a:xfrm>
           <a:prstGeom prst="rect">
             <a:avLst/>
@@ -8546,7 +7491,7 @@
         <p:spPr>
           <a:xfrm>
             <a:off x="504000" y="226080"/>
-            <a:ext cx="9070200" cy="945000"/>
+            <a:ext cx="9069480" cy="944280"/>
           </a:xfrm>
           <a:prstGeom prst="rect">
             <a:avLst/>
@@ -8598,7 +7543,7 @@
         <p:spPr>
           <a:xfrm>
             <a:off x="504000" y="1326600"/>
-            <a:ext cx="9070200" cy="3286800"/>
+            <a:ext cx="9069480" cy="3286080"/>
           </a:xfrm>
           <a:prstGeom prst="rect">
             <a:avLst/>
@@ -8737,13 +7682,22 @@
               </a:tabLst>
             </a:pPr>
             <a:r>
+              <a:rPr b="1" lang="en-US" sz="3200" spc="-1" strike="noStrike">
+                <a:solidFill>
+                  <a:srgbClr val="000000"/>
+                </a:solidFill>
+                <a:latin typeface="Arial"/>
+              </a:rPr>
+              <a:t>Objective</a:t>
+            </a:r>
+            <a:r>
               <a:rPr b="0" lang="en-US" sz="3200" spc="-1" strike="noStrike">
                 <a:solidFill>
                   <a:srgbClr val="000000"/>
                 </a:solidFill>
                 <a:latin typeface="Arial"/>
               </a:rPr>
-              <a:t>Objective: Maximize gross profit</a:t>
+              <a:t>: Maximize gross profit</a:t>
             </a:r>
             <a:endParaRPr b="0" lang="en-AU" sz="3200" spc="-1" strike="noStrike">
               <a:latin typeface="Arial"/>
@@ -8794,7 +7748,7 @@
         <p:spPr>
           <a:xfrm>
             <a:off x="504000" y="226080"/>
-            <a:ext cx="9070200" cy="945000"/>
+            <a:ext cx="9069480" cy="944280"/>
           </a:xfrm>
           <a:prstGeom prst="rect">
             <a:avLst/>
@@ -8846,7 +7800,7 @@
         <p:spPr>
           <a:xfrm>
             <a:off x="504000" y="1326600"/>
-            <a:ext cx="9070200" cy="3286800"/>
+            <a:ext cx="9069480" cy="3286080"/>
           </a:xfrm>
           <a:prstGeom prst="rect">
             <a:avLst/>
@@ -9045,7 +7999,7 @@
         <p:spPr>
           <a:xfrm>
             <a:off x="504000" y="226080"/>
-            <a:ext cx="9070200" cy="945000"/>
+            <a:ext cx="9069480" cy="944280"/>
           </a:xfrm>
           <a:prstGeom prst="rect">
             <a:avLst/>
@@ -9076,61 +8030,7 @@
                 </a:solidFill>
                 <a:latin typeface="Arial"/>
               </a:rPr>
-              <a:t>Git</a:t>
-            </a:r>
-            <a:r>
-              <a:rPr b="0" lang="en-US" sz="4400" spc="-1" strike="noStrike">
-                <a:solidFill>
-                  <a:srgbClr val="000000"/>
-                </a:solidFill>
-                <a:latin typeface="Arial"/>
-              </a:rPr>
-              <a:t>Hu</a:t>
-            </a:r>
-            <a:r>
-              <a:rPr b="0" lang="en-US" sz="4400" spc="-1" strike="noStrike">
-                <a:solidFill>
-                  <a:srgbClr val="000000"/>
-                </a:solidFill>
-                <a:latin typeface="Arial"/>
-              </a:rPr>
-              <a:t>b </a:t>
-            </a:r>
-            <a:r>
-              <a:rPr b="0" lang="en-US" sz="4400" spc="-1" strike="noStrike">
-                <a:solidFill>
-                  <a:srgbClr val="000000"/>
-                </a:solidFill>
-                <a:latin typeface="Arial"/>
-              </a:rPr>
-              <a:t>Re</a:t>
-            </a:r>
-            <a:r>
-              <a:rPr b="0" lang="en-US" sz="4400" spc="-1" strike="noStrike">
-                <a:solidFill>
-                  <a:srgbClr val="000000"/>
-                </a:solidFill>
-                <a:latin typeface="Arial"/>
-              </a:rPr>
-              <a:t>pos</a:t>
-            </a:r>
-            <a:r>
-              <a:rPr b="0" lang="en-US" sz="4400" spc="-1" strike="noStrike">
-                <a:solidFill>
-                  <a:srgbClr val="000000"/>
-                </a:solidFill>
-                <a:latin typeface="Arial"/>
-              </a:rPr>
-              <a:t>itor</a:t>
-            </a:r>
-            <a:r>
-              <a:rPr b="0" lang="en-US" sz="4400" spc="-1" strike="noStrike">
-                <a:solidFill>
-                  <a:srgbClr val="000000"/>
-                </a:solidFill>
-                <a:latin typeface="Arial"/>
-              </a:rPr>
-              <a:t>y</a:t>
+              <a:t>GitHub Repository</a:t>
             </a:r>
             <a:endParaRPr b="0" lang="en-AU" sz="4400" spc="-1" strike="noStrike">
               <a:latin typeface="Arial"/>
@@ -9151,7 +8051,7 @@
         <p:spPr>
           <a:xfrm>
             <a:off x="3395520" y="1326240"/>
-            <a:ext cx="3286800" cy="3286800"/>
+            <a:ext cx="3286080" cy="3286080"/>
           </a:xfrm>
           <a:prstGeom prst="rect">
             <a:avLst/>
@@ -9204,7 +8104,7 @@
         <p:spPr>
           <a:xfrm>
             <a:off x="504000" y="226080"/>
-            <a:ext cx="9070200" cy="945000"/>
+            <a:ext cx="9069480" cy="944280"/>
           </a:xfrm>
           <a:prstGeom prst="rect">
             <a:avLst/>
@@ -9220,6 +8120,9 @@
           </a:bodyPr>
           <a:p>
             <a:pPr algn="ctr">
+              <a:lnSpc>
+                <a:spcPct val="100000"/>
+              </a:lnSpc>
               <a:buNone/>
             </a:pPr>
             <a:r>
@@ -9242,7 +8145,7 @@
         </p:nvGraphicFramePr>
         <p:xfrm>
           <a:off x="838800" y="1533960"/>
-          <a:ext cx="10543320" cy="3037680"/>
+          <a:ext cx="8225280" cy="3037680"/>
         </p:xfrm>
         <a:graphic>
           <a:graphicData uri="http://schemas.openxmlformats.org/drawingml/2006/table">
@@ -9287,11 +8190,14 @@
                 </a:tc>
                 <a:tc>
                   <a:txBody>
-                    <a:bodyPr lIns="90000" rIns="90000" tIns="46800" bIns="46800" anchor="ctr">
+                    <a:bodyPr lIns="90000" rIns="90000" anchor="ctr">
                       <a:noAutofit/>
                     </a:bodyPr>
                     <a:p>
                       <a:pPr algn="ctr">
+                        <a:lnSpc>
+                          <a:spcPct val="100000"/>
+                        </a:lnSpc>
                         <a:buNone/>
                       </a:pPr>
                       <a:r>
@@ -9333,28 +8239,24 @@
                 </a:tc>
                 <a:tc>
                   <a:txBody>
-                    <a:bodyPr lIns="90000" rIns="90000" tIns="46800" bIns="46800" anchor="ctr">
+                    <a:bodyPr lIns="90000" rIns="90000" anchor="ctr">
                       <a:noAutofit/>
                     </a:bodyPr>
                     <a:p>
                       <a:pPr algn="ctr">
+                        <a:lnSpc>
+                          <a:spcPct val="100000"/>
+                        </a:lnSpc>
                         <a:buNone/>
                       </a:pPr>
                       <a:r>
                         <a:rPr b="0" lang="en-AU" sz="1600" spc="-1" strike="noStrike">
                           <a:latin typeface="Arial"/>
                         </a:rPr>
-                        <a:t>Avg </a:t>
-                      </a:r>
-                      <a:r>
-                        <a:rPr b="0" lang="en-AU" sz="1600" spc="-1" strike="noStrike">
-                          <a:latin typeface="Arial"/>
-                        </a:rPr>
-                        <a:t>Price</a:t>
+                        <a:t>Avg Price ($)</a:t>
                       </a:r>
                       <a:endParaRPr b="0" lang="en-AU" sz="1600" spc="-1" strike="noStrike">
                         <a:latin typeface="Arial"/>
-                        <a:ea typeface="Noto Sans Mono CJK JP"/>
                       </a:endParaRPr>
                     </a:p>
                   </a:txBody>
@@ -9386,11 +8288,14 @@
                 </a:tc>
                 <a:tc>
                   <a:txBody>
-                    <a:bodyPr lIns="90000" rIns="90000" tIns="46800" bIns="46800" anchor="ctr">
+                    <a:bodyPr lIns="90000" rIns="90000" anchor="ctr">
                       <a:noAutofit/>
                     </a:bodyPr>
                     <a:p>
                       <a:pPr marL="216000" indent="-216000" algn="ctr">
+                        <a:lnSpc>
+                          <a:spcPct val="100000"/>
+                        </a:lnSpc>
                         <a:buClr>
                           <a:srgbClr val="000000"/>
                         </a:buClr>
@@ -9402,11 +8307,10 @@
                         <a:rPr b="0" lang="en-AU" sz="1600" spc="-1" strike="noStrike">
                           <a:latin typeface="Arial"/>
                         </a:rPr>
-                        <a:t>Avg qty</a:t>
+                        <a:t>Avg Qty</a:t>
                       </a:r>
                       <a:endParaRPr b="0" lang="en-AU" sz="1600" spc="-1" strike="noStrike">
                         <a:latin typeface="Arial"/>
-                        <a:ea typeface="Noto Sans Mono CJK JP"/>
                       </a:endParaRPr>
                     </a:p>
                   </a:txBody>
@@ -9438,11 +8342,14 @@
                 </a:tc>
                 <a:tc>
                   <a:txBody>
-                    <a:bodyPr lIns="90000" rIns="90000" tIns="46800" bIns="46800" anchor="ctr">
+                    <a:bodyPr lIns="90000" rIns="90000" anchor="ctr">
                       <a:noAutofit/>
                     </a:bodyPr>
                     <a:p>
                       <a:pPr algn="ctr">
+                        <a:lnSpc>
+                          <a:spcPct val="100000"/>
+                        </a:lnSpc>
                         <a:buNone/>
                       </a:pPr>
                       <a:r>
@@ -9484,18 +8391,21 @@
                 </a:tc>
                 <a:tc>
                   <a:txBody>
-                    <a:bodyPr lIns="90000" rIns="90000" tIns="46800" bIns="46800" anchor="ctr">
+                    <a:bodyPr lIns="90000" rIns="90000" anchor="ctr">
                       <a:noAutofit/>
                     </a:bodyPr>
                     <a:p>
                       <a:pPr algn="ctr">
+                        <a:lnSpc>
+                          <a:spcPct val="100000"/>
+                        </a:lnSpc>
                         <a:buNone/>
                       </a:pPr>
                       <a:r>
                         <a:rPr b="0" lang="en-AU" sz="1600" spc="-1" strike="noStrike">
                           <a:latin typeface="Arial"/>
                         </a:rPr>
-                        <a:t>Qty sold</a:t>
+                        <a:t>Qty Sold</a:t>
                       </a:r>
                       <a:endParaRPr b="0" lang="en-AU" sz="1600" spc="-1" strike="noStrike">
                         <a:latin typeface="Arial"/>
@@ -9530,18 +8440,21 @@
                 </a:tc>
                 <a:tc>
                   <a:txBody>
-                    <a:bodyPr lIns="90000" rIns="90000" tIns="46800" bIns="46800" anchor="ctr">
+                    <a:bodyPr lIns="90000" rIns="90000" anchor="ctr">
                       <a:noAutofit/>
                     </a:bodyPr>
                     <a:p>
                       <a:pPr algn="ctr">
+                        <a:lnSpc>
+                          <a:spcPct val="100000"/>
+                        </a:lnSpc>
                         <a:buNone/>
                       </a:pPr>
                       <a:r>
                         <a:rPr b="0" lang="en-AU" sz="1600" spc="-1" strike="noStrike">
                           <a:latin typeface="Arial"/>
                         </a:rPr>
-                        <a:t>Gross Profit</a:t>
+                        <a:t>GP ($)</a:t>
                       </a:r>
                       <a:endParaRPr b="0" lang="en-AU" sz="1600" spc="-1" strike="noStrike">
                         <a:latin typeface="Arial"/>
@@ -9578,11 +8491,14 @@
               <a:tr h="758880">
                 <a:tc>
                   <a:txBody>
-                    <a:bodyPr lIns="90000" rIns="90000" tIns="46800" bIns="46800" anchor="ctr">
+                    <a:bodyPr lIns="90000" rIns="90000" anchor="ctr">
                       <a:noAutofit/>
                     </a:bodyPr>
                     <a:p>
                       <a:pPr algn="ctr">
+                        <a:lnSpc>
+                          <a:spcPct val="100000"/>
+                        </a:lnSpc>
                         <a:buNone/>
                       </a:pPr>
                       <a:r>
@@ -9624,11 +8540,14 @@
                 </a:tc>
                 <a:tc>
                   <a:txBody>
-                    <a:bodyPr lIns="90000" rIns="90000" tIns="46800" bIns="46800" anchor="ctr">
+                    <a:bodyPr lIns="90000" rIns="90000" anchor="ctr">
                       <a:noAutofit/>
                     </a:bodyPr>
                     <a:p>
                       <a:pPr algn="ctr">
+                        <a:lnSpc>
+                          <a:spcPct val="100000"/>
+                        </a:lnSpc>
                         <a:buNone/>
                       </a:pPr>
                       <a:r>
@@ -9670,11 +8589,14 @@
                 </a:tc>
                 <a:tc>
                   <a:txBody>
-                    <a:bodyPr lIns="90000" rIns="90000" tIns="46800" bIns="46800" anchor="ctr">
+                    <a:bodyPr lIns="90000" rIns="90000" anchor="ctr">
                       <a:noAutofit/>
                     </a:bodyPr>
                     <a:p>
                       <a:pPr algn="ctr">
+                        <a:lnSpc>
+                          <a:spcPct val="100000"/>
+                        </a:lnSpc>
                         <a:buNone/>
                       </a:pPr>
                       <a:r>
@@ -9716,11 +8638,14 @@
                 </a:tc>
                 <a:tc>
                   <a:txBody>
-                    <a:bodyPr lIns="90000" rIns="90000" tIns="46800" bIns="46800" anchor="ctr">
+                    <a:bodyPr lIns="90000" rIns="90000" anchor="ctr">
                       <a:noAutofit/>
                     </a:bodyPr>
                     <a:p>
                       <a:pPr algn="ctr">
+                        <a:lnSpc>
+                          <a:spcPct val="100000"/>
+                        </a:lnSpc>
                         <a:buNone/>
                       </a:pPr>
                       <a:r>
@@ -9762,18 +8687,21 @@
                 </a:tc>
                 <a:tc>
                   <a:txBody>
-                    <a:bodyPr lIns="90000" rIns="90000" tIns="46800" bIns="46800" anchor="ctr">
+                    <a:bodyPr lIns="90000" rIns="90000" anchor="ctr">
                       <a:noAutofit/>
                     </a:bodyPr>
                     <a:p>
                       <a:pPr algn="ctr">
+                        <a:lnSpc>
+                          <a:spcPct val="100000"/>
+                        </a:lnSpc>
                         <a:buNone/>
                       </a:pPr>
                       <a:r>
                         <a:rPr b="0" lang="en-AU" sz="1600" spc="-1" strike="noStrike">
                           <a:latin typeface="Arial"/>
                         </a:rPr>
-                        <a:t>3300.72</a:t>
+                        <a:t>3,300.72</a:t>
                       </a:r>
                       <a:endParaRPr b="0" lang="en-AU" sz="1600" spc="-1" strike="noStrike">
                         <a:latin typeface="Arial"/>
@@ -9808,11 +8736,14 @@
                 </a:tc>
                 <a:tc>
                   <a:txBody>
-                    <a:bodyPr lIns="90000" rIns="90000" tIns="46800" bIns="46800" anchor="ctr">
+                    <a:bodyPr lIns="90000" rIns="90000" anchor="ctr">
                       <a:noAutofit/>
                     </a:bodyPr>
                     <a:p>
                       <a:pPr algn="ctr">
+                        <a:lnSpc>
+                          <a:spcPct val="100000"/>
+                        </a:lnSpc>
                         <a:buNone/>
                       </a:pPr>
                       <a:r>
@@ -9854,18 +8785,21 @@
                 </a:tc>
                 <a:tc>
                   <a:txBody>
-                    <a:bodyPr lIns="90000" rIns="90000" tIns="46800" bIns="46800" anchor="ctr">
+                    <a:bodyPr lIns="90000" rIns="90000" anchor="ctr">
                       <a:noAutofit/>
                     </a:bodyPr>
                     <a:p>
                       <a:pPr algn="ctr">
+                        <a:lnSpc>
+                          <a:spcPct val="100000"/>
+                        </a:lnSpc>
                         <a:buNone/>
                       </a:pPr>
                       <a:r>
                         <a:rPr b="0" lang="en-AU" sz="1600" spc="-1" strike="noStrike">
                           <a:latin typeface="Arial"/>
                         </a:rPr>
-                        <a:t>1782.03</a:t>
+                        <a:t>1,782.03</a:t>
                       </a:r>
                       <a:endParaRPr b="0" lang="en-AU" sz="1600" spc="-1" strike="noStrike">
                         <a:latin typeface="Arial"/>
@@ -9902,11 +8836,14 @@
               <a:tr h="759600">
                 <a:tc>
                   <a:txBody>
-                    <a:bodyPr lIns="90000" rIns="90000" tIns="46800" bIns="46800" anchor="ctr">
+                    <a:bodyPr lIns="90000" rIns="90000" anchor="ctr">
                       <a:noAutofit/>
                     </a:bodyPr>
                     <a:p>
                       <a:pPr algn="ctr">
+                        <a:lnSpc>
+                          <a:spcPct val="100000"/>
+                        </a:lnSpc>
                         <a:buNone/>
                       </a:pPr>
                       <a:r>
@@ -9948,11 +8885,14 @@
                 </a:tc>
                 <a:tc>
                   <a:txBody>
-                    <a:bodyPr lIns="90000" rIns="90000" tIns="46800" bIns="46800" anchor="ctr">
+                    <a:bodyPr lIns="90000" rIns="90000" anchor="ctr">
                       <a:noAutofit/>
                     </a:bodyPr>
                     <a:p>
                       <a:pPr algn="ctr">
+                        <a:lnSpc>
+                          <a:spcPct val="100000"/>
+                        </a:lnSpc>
                         <a:buNone/>
                       </a:pPr>
                       <a:r>
@@ -9963,7 +8903,6 @@
                       </a:r>
                       <a:endParaRPr b="0" lang="en-AU" sz="1600" spc="-1" strike="noStrike">
                         <a:latin typeface="Arial"/>
-                        <a:ea typeface="Noto Sans Mono CJK JP"/>
                       </a:endParaRPr>
                     </a:p>
                   </a:txBody>
@@ -9995,11 +8934,14 @@
                 </a:tc>
                 <a:tc>
                   <a:txBody>
-                    <a:bodyPr lIns="90000" rIns="90000" tIns="46800" bIns="46800" anchor="ctr">
+                    <a:bodyPr lIns="90000" rIns="90000" anchor="ctr">
                       <a:noAutofit/>
                     </a:bodyPr>
                     <a:p>
                       <a:pPr algn="ctr">
+                        <a:lnSpc>
+                          <a:spcPct val="100000"/>
+                        </a:lnSpc>
                         <a:buNone/>
                       </a:pPr>
                       <a:r>
@@ -10010,7 +8952,6 @@
                       </a:r>
                       <a:endParaRPr b="0" lang="en-AU" sz="1600" spc="-1" strike="noStrike">
                         <a:latin typeface="Arial"/>
-                        <a:ea typeface="Noto Sans Mono CJK JP"/>
                       </a:endParaRPr>
                     </a:p>
                   </a:txBody>
@@ -10042,22 +8983,24 @@
                 </a:tc>
                 <a:tc>
                   <a:txBody>
-                    <a:bodyPr lIns="90000" rIns="90000" tIns="46800" bIns="46800" anchor="ctr">
+                    <a:bodyPr lIns="90000" rIns="90000" anchor="ctr">
                       <a:noAutofit/>
                     </a:bodyPr>
                     <a:p>
                       <a:pPr algn="ctr">
+                        <a:lnSpc>
+                          <a:spcPct val="100000"/>
+                        </a:lnSpc>
                         <a:buNone/>
                       </a:pPr>
                       <a:r>
                         <a:rPr b="0" lang="en-AU" sz="1600" spc="-1" strike="noStrike">
                           <a:latin typeface="Arial"/>
                         </a:rPr>
-                        <a:t>12.80</a:t>
+                        <a:t>3.32</a:t>
                       </a:r>
                       <a:endParaRPr b="0" lang="en-AU" sz="1600" spc="-1" strike="noStrike">
                         <a:latin typeface="Arial"/>
-                        <a:ea typeface="Noto Sans Mono CJK JP"/>
                       </a:endParaRPr>
                     </a:p>
                   </a:txBody>
@@ -10089,18 +9032,21 @@
                 </a:tc>
                 <a:tc>
                   <a:txBody>
-                    <a:bodyPr lIns="90000" rIns="90000" tIns="46800" bIns="46800" anchor="ctr">
+                    <a:bodyPr lIns="90000" rIns="90000" anchor="ctr">
                       <a:noAutofit/>
                     </a:bodyPr>
                     <a:p>
                       <a:pPr algn="ctr">
+                        <a:lnSpc>
+                          <a:spcPct val="100000"/>
+                        </a:lnSpc>
                         <a:buNone/>
                       </a:pPr>
                       <a:r>
                         <a:rPr b="0" lang="en-AU" sz="1600" spc="-1" strike="noStrike">
                           <a:latin typeface="Arial"/>
                         </a:rPr>
-                        <a:t>3614.80</a:t>
+                        <a:t>3,614.80</a:t>
                       </a:r>
                       <a:endParaRPr b="0" lang="en-AU" sz="1600" spc="-1" strike="noStrike">
                         <a:latin typeface="Arial"/>
@@ -10135,11 +9081,14 @@
                 </a:tc>
                 <a:tc>
                   <a:txBody>
-                    <a:bodyPr lIns="90000" rIns="90000" tIns="46800" bIns="46800" anchor="ctr">
+                    <a:bodyPr lIns="90000" rIns="90000" anchor="ctr">
                       <a:noAutofit/>
                     </a:bodyPr>
                     <a:p>
                       <a:pPr algn="ctr">
+                        <a:lnSpc>
+                          <a:spcPct val="100000"/>
+                        </a:lnSpc>
                         <a:buNone/>
                       </a:pPr>
                       <a:r>
@@ -10181,18 +9130,21 @@
                 </a:tc>
                 <a:tc>
                   <a:txBody>
-                    <a:bodyPr lIns="90000" rIns="90000" tIns="46800" bIns="46800" anchor="ctr">
+                    <a:bodyPr lIns="90000" rIns="90000" anchor="ctr">
                       <a:noAutofit/>
                     </a:bodyPr>
                     <a:p>
                       <a:pPr algn="ctr">
+                        <a:lnSpc>
+                          <a:spcPct val="100000"/>
+                        </a:lnSpc>
                         <a:buNone/>
                       </a:pPr>
                       <a:r>
                         <a:rPr b="0" lang="en-AU" sz="1600" spc="-1" strike="noStrike">
                           <a:latin typeface="Arial"/>
                         </a:rPr>
-                        <a:t>1977.24</a:t>
+                        <a:t>1,977.24</a:t>
                       </a:r>
                       <a:endParaRPr b="0" lang="en-AU" sz="1600" spc="-1" strike="noStrike">
                         <a:latin typeface="Arial"/>
@@ -10229,11 +9181,14 @@
               <a:tr h="760680">
                 <a:tc>
                   <a:txBody>
-                    <a:bodyPr lIns="90000" rIns="90000" tIns="46800" bIns="46800" anchor="ctr">
+                    <a:bodyPr lIns="90000" rIns="90000" anchor="ctr">
                       <a:noAutofit/>
                     </a:bodyPr>
                     <a:p>
                       <a:pPr algn="ctr">
+                        <a:lnSpc>
+                          <a:spcPct val="100000"/>
+                        </a:lnSpc>
                         <a:buNone/>
                       </a:pPr>
                       <a:r>
@@ -10275,11 +9230,14 @@
                 </a:tc>
                 <a:tc>
                   <a:txBody>
-                    <a:bodyPr lIns="90000" rIns="90000" tIns="46800" bIns="46800" anchor="ctr">
+                    <a:bodyPr lIns="90000" rIns="90000" anchor="ctr">
                       <a:noAutofit/>
                     </a:bodyPr>
                     <a:p>
                       <a:pPr algn="ctr">
+                        <a:lnSpc>
+                          <a:spcPct val="100000"/>
+                        </a:lnSpc>
                         <a:buNone/>
                       </a:pPr>
                       <a:r>
@@ -10290,7 +9248,6 @@
                       </a:r>
                       <a:endParaRPr b="0" lang="en-AU" sz="1600" spc="-1" strike="noStrike">
                         <a:latin typeface="Arial"/>
-                        <a:ea typeface="Noto Sans Mono CJK JP"/>
                       </a:endParaRPr>
                     </a:p>
                   </a:txBody>
@@ -10349,11 +9306,14 @@
                 </a:tc>
                 <a:tc>
                   <a:txBody>
-                    <a:bodyPr lIns="90000" rIns="90000" tIns="46800" bIns="46800" anchor="ctr">
+                    <a:bodyPr lIns="90000" rIns="90000" anchor="ctr">
                       <a:noAutofit/>
                     </a:bodyPr>
                     <a:p>
                       <a:pPr marL="216000" indent="-216000" algn="ctr">
+                        <a:lnSpc>
+                          <a:spcPct val="100000"/>
+                        </a:lnSpc>
                         <a:buClr>
                           <a:srgbClr val="000000"/>
                         </a:buClr>
@@ -10369,7 +9329,6 @@
                       </a:r>
                       <a:endParaRPr b="0" lang="en-AU" sz="1600" spc="-1" strike="noStrike">
                         <a:latin typeface="Arial"/>
-                        <a:ea typeface="Noto Sans Mono CJK JP"/>
                       </a:endParaRPr>
                     </a:p>
                   </a:txBody>
@@ -10401,18 +9360,21 @@
                 </a:tc>
                 <a:tc>
                   <a:txBody>
-                    <a:bodyPr lIns="90000" rIns="90000" tIns="46800" bIns="46800" anchor="ctr">
+                    <a:bodyPr lIns="90000" rIns="90000" anchor="ctr">
                       <a:noAutofit/>
                     </a:bodyPr>
                     <a:p>
                       <a:pPr algn="ctr">
+                        <a:lnSpc>
+                          <a:spcPct val="100000"/>
+                        </a:lnSpc>
                         <a:buNone/>
                       </a:pPr>
                       <a:r>
                         <a:rPr b="0" lang="en-AU" sz="1600" spc="-1" strike="noStrike">
                           <a:latin typeface="Arial"/>
                         </a:rPr>
-                        <a:t>6915.52</a:t>
+                        <a:t>6,915.52</a:t>
                       </a:r>
                       <a:endParaRPr b="0" lang="en-AU" sz="1600" spc="-1" strike="noStrike">
                         <a:latin typeface="Arial"/>
@@ -10447,11 +9409,14 @@
                 </a:tc>
                 <a:tc>
                   <a:txBody>
-                    <a:bodyPr lIns="90000" rIns="90000" tIns="46800" bIns="46800" anchor="ctr">
+                    <a:bodyPr lIns="90000" rIns="90000" anchor="ctr">
                       <a:noAutofit/>
                     </a:bodyPr>
                     <a:p>
                       <a:pPr algn="ctr">
+                        <a:lnSpc>
+                          <a:spcPct val="100000"/>
+                        </a:lnSpc>
                         <a:buNone/>
                       </a:pPr>
                       <a:r>
@@ -10493,18 +9458,21 @@
                 </a:tc>
                 <a:tc>
                   <a:txBody>
-                    <a:bodyPr lIns="90000" rIns="90000" tIns="46800" bIns="46800" anchor="ctr">
+                    <a:bodyPr lIns="90000" rIns="90000" anchor="ctr">
                       <a:noAutofit/>
                     </a:bodyPr>
                     <a:p>
                       <a:pPr algn="ctr">
+                        <a:lnSpc>
+                          <a:spcPct val="100000"/>
+                        </a:lnSpc>
                         <a:buNone/>
                       </a:pPr>
                       <a:r>
                         <a:rPr b="0" lang="en-AU" sz="1600" spc="-1" strike="noStrike">
                           <a:latin typeface="Arial"/>
                         </a:rPr>
-                        <a:t>3759.27</a:t>
+                        <a:t>3,759.27</a:t>
                       </a:r>
                       <a:endParaRPr b="0" lang="en-AU" sz="1600" spc="-1" strike="noStrike">
                         <a:latin typeface="Arial"/>
@@ -10585,7 +9553,7 @@
         <p:spPr>
           <a:xfrm>
             <a:off x="504000" y="226080"/>
-            <a:ext cx="9070200" cy="945000"/>
+            <a:ext cx="9069480" cy="944280"/>
           </a:xfrm>
           <a:prstGeom prst="rect">
             <a:avLst/>
@@ -10637,7 +9605,7 @@
         <p:spPr>
           <a:xfrm>
             <a:off x="469440" y="1326600"/>
-            <a:ext cx="9070200" cy="3286800"/>
+            <a:ext cx="9069480" cy="3286080"/>
           </a:xfrm>
           <a:prstGeom prst="rect">
             <a:avLst/>
@@ -10808,7 +9776,7 @@
         <p:spPr>
           <a:xfrm>
             <a:off x="504000" y="226080"/>
-            <a:ext cx="9070200" cy="945000"/>
+            <a:ext cx="9069480" cy="944280"/>
           </a:xfrm>
           <a:prstGeom prst="rect">
             <a:avLst/>
@@ -10839,70 +9807,7 @@
                 </a:solidFill>
                 <a:latin typeface="Arial"/>
               </a:rPr>
-              <a:t>Exp</a:t>
-            </a:r>
-            <a:r>
-              <a:rPr b="0" lang="en-US" sz="4400" spc="-1" strike="noStrike">
-                <a:solidFill>
-                  <a:srgbClr val="000000"/>
-                </a:solidFill>
-                <a:latin typeface="Arial"/>
-              </a:rPr>
-              <a:t>lora</a:t>
-            </a:r>
-            <a:r>
-              <a:rPr b="0" lang="en-US" sz="4400" spc="-1" strike="noStrike">
-                <a:solidFill>
-                  <a:srgbClr val="000000"/>
-                </a:solidFill>
-                <a:latin typeface="Arial"/>
-              </a:rPr>
-              <a:t>tory </a:t>
-            </a:r>
-            <a:r>
-              <a:rPr b="0" lang="en-US" sz="4400" spc="-1" strike="noStrike">
-                <a:solidFill>
-                  <a:srgbClr val="000000"/>
-                </a:solidFill>
-                <a:latin typeface="Arial"/>
-              </a:rPr>
-              <a:t>Dat</a:t>
-            </a:r>
-            <a:r>
-              <a:rPr b="0" lang="en-US" sz="4400" spc="-1" strike="noStrike">
-                <a:solidFill>
-                  <a:srgbClr val="000000"/>
-                </a:solidFill>
-                <a:latin typeface="Arial"/>
-              </a:rPr>
-              <a:t>a </a:t>
-            </a:r>
-            <a:r>
-              <a:rPr b="0" lang="en-US" sz="4400" spc="-1" strike="noStrike">
-                <a:solidFill>
-                  <a:srgbClr val="000000"/>
-                </a:solidFill>
-                <a:latin typeface="Arial"/>
-              </a:rPr>
-              <a:t>An</a:t>
-            </a:r>
-            <a:r>
-              <a:rPr b="0" lang="en-US" sz="4400" spc="-1" strike="noStrike">
-                <a:solidFill>
-                  <a:srgbClr val="000000"/>
-                </a:solidFill>
-                <a:latin typeface="Arial"/>
-              </a:rPr>
-              <a:t>aly</a:t>
-            </a:r>
-            <a:r>
-              <a:rPr b="0" lang="en-US" sz="4400" spc="-1" strike="noStrike">
-                <a:solidFill>
-                  <a:srgbClr val="000000"/>
-                </a:solidFill>
-                <a:latin typeface="Arial"/>
-              </a:rPr>
-              <a:t>sis</a:t>
+              <a:t>Exploratory Data Analysis</a:t>
             </a:r>
             <a:endParaRPr b="0" lang="en-AU" sz="4400" spc="-1" strike="noStrike">
               <a:latin typeface="Arial"/>
@@ -10923,7 +9828,7 @@
         <p:spPr>
           <a:xfrm>
             <a:off x="1821960" y="1039320"/>
-            <a:ext cx="6476760" cy="4626000"/>
+            <a:ext cx="6476040" cy="4625280"/>
           </a:xfrm>
           <a:prstGeom prst="rect">
             <a:avLst/>
@@ -10976,7 +9881,7 @@
         <p:spPr>
           <a:xfrm>
             <a:off x="504000" y="74160"/>
-            <a:ext cx="9070200" cy="1248840"/>
+            <a:ext cx="9069480" cy="1248120"/>
           </a:xfrm>
           <a:prstGeom prst="rect">
             <a:avLst/>
@@ -11007,7 +9912,7 @@
                 </a:solidFill>
                 <a:latin typeface="Arial"/>
               </a:rPr>
-              <a:t>Relationship Between Product Price &amp; Sales</a:t>
+              <a:t>Relationship Between Product Price &amp; Quantity Sold</a:t>
             </a:r>
             <a:endParaRPr b="0" lang="en-AU" sz="4400" spc="-1" strike="noStrike">
               <a:latin typeface="Arial"/>
@@ -11027,8 +9932,8 @@
         </p:blipFill>
         <p:spPr>
           <a:xfrm>
-            <a:off x="6120" y="1481040"/>
-            <a:ext cx="5144040" cy="3085920"/>
+            <a:off x="4741200" y="1476000"/>
+            <a:ext cx="5339520" cy="3203640"/>
           </a:xfrm>
           <a:prstGeom prst="rect">
             <a:avLst/>
@@ -11050,8 +9955,8 @@
         </p:blipFill>
         <p:spPr>
           <a:xfrm>
-            <a:off x="4906800" y="1481040"/>
-            <a:ext cx="5150160" cy="3089520"/>
+            <a:off x="1440" y="1476000"/>
+            <a:ext cx="5339520" cy="3203640"/>
           </a:xfrm>
           <a:prstGeom prst="rect">
             <a:avLst/>
@@ -11104,7 +10009,7 @@
         <p:spPr>
           <a:xfrm>
             <a:off x="504000" y="226080"/>
-            <a:ext cx="9070200" cy="945000"/>
+            <a:ext cx="9069480" cy="944280"/>
           </a:xfrm>
           <a:prstGeom prst="rect">
             <a:avLst/>
@@ -11135,79 +10040,7 @@
                 </a:solidFill>
                 <a:latin typeface="Arial"/>
               </a:rPr>
-              <a:t>Pric</a:t>
-            </a:r>
-            <a:r>
-              <a:rPr b="0" lang="en-US" sz="4400" spc="-1" strike="noStrike">
-                <a:solidFill>
-                  <a:srgbClr val="000000"/>
-                </a:solidFill>
-                <a:latin typeface="Arial"/>
-              </a:rPr>
-              <a:t>e </a:t>
-            </a:r>
-            <a:r>
-              <a:rPr b="0" lang="en-US" sz="4400" spc="-1" strike="noStrike">
-                <a:solidFill>
-                  <a:srgbClr val="000000"/>
-                </a:solidFill>
-                <a:latin typeface="Arial"/>
-              </a:rPr>
-              <a:t>Ela</a:t>
-            </a:r>
-            <a:r>
-              <a:rPr b="0" lang="en-US" sz="4400" spc="-1" strike="noStrike">
-                <a:solidFill>
-                  <a:srgbClr val="000000"/>
-                </a:solidFill>
-                <a:latin typeface="Arial"/>
-              </a:rPr>
-              <a:t>stici</a:t>
-            </a:r>
-            <a:r>
-              <a:rPr b="0" lang="en-US" sz="4400" spc="-1" strike="noStrike">
-                <a:solidFill>
-                  <a:srgbClr val="000000"/>
-                </a:solidFill>
-                <a:latin typeface="Arial"/>
-              </a:rPr>
-              <a:t>ty </a:t>
-            </a:r>
-            <a:r>
-              <a:rPr b="0" lang="en-US" sz="4400" spc="-1" strike="noStrike">
-                <a:solidFill>
-                  <a:srgbClr val="000000"/>
-                </a:solidFill>
-                <a:latin typeface="Arial"/>
-              </a:rPr>
-              <a:t>Co</a:t>
-            </a:r>
-            <a:r>
-              <a:rPr b="0" lang="en-US" sz="4400" spc="-1" strike="noStrike">
-                <a:solidFill>
-                  <a:srgbClr val="000000"/>
-                </a:solidFill>
-                <a:latin typeface="Arial"/>
-              </a:rPr>
-              <a:t>mp</a:t>
-            </a:r>
-            <a:r>
-              <a:rPr b="0" lang="en-US" sz="4400" spc="-1" strike="noStrike">
-                <a:solidFill>
-                  <a:srgbClr val="000000"/>
-                </a:solidFill>
-                <a:latin typeface="Arial"/>
-              </a:rPr>
-              <a:t>aris</a:t>
-            </a:r>
-            <a:r>
-              <a:rPr b="0" lang="en-US" sz="4400" spc="-1" strike="noStrike">
-                <a:solidFill>
-                  <a:srgbClr val="000000"/>
-                </a:solidFill>
-                <a:latin typeface="Arial"/>
-              </a:rPr>
-              <a:t>on</a:t>
+              <a:t>Price Elasticity Comparison</a:t>
             </a:r>
             <a:endParaRPr b="0" lang="en-AU" sz="4400" spc="-1" strike="noStrike">
               <a:latin typeface="Arial"/>
@@ -11228,7 +10061,7 @@
         <p:spPr>
           <a:xfrm>
             <a:off x="469440" y="1326600"/>
-            <a:ext cx="9070200" cy="3286800"/>
+            <a:ext cx="9069480" cy="3286080"/>
           </a:xfrm>
           <a:prstGeom prst="rect">
             <a:avLst/>
@@ -11347,16 +10180,7 @@
                 </a:solidFill>
                 <a:latin typeface="Arial"/>
               </a:rPr>
-              <a:t>:  Individuale is twice as price elastic </a:t>
-            </a:r>
-            <a:r>
-              <a:rPr b="0" lang="en-US" sz="3200" spc="-1" strike="noStrike">
-                <a:solidFill>
-                  <a:srgbClr val="000000"/>
-                </a:solidFill>
-                <a:latin typeface="Arial"/>
-              </a:rPr>
-              <a:t>as Communita</a:t>
+              <a:t>:  Individuale is twice as price elastic as Communita</a:t>
             </a:r>
             <a:endParaRPr b="0" lang="en-AU" sz="3200" spc="-1" strike="noStrike">
               <a:latin typeface="Arial"/>
@@ -11407,7 +10231,7 @@
         <p:spPr>
           <a:xfrm>
             <a:off x="504000" y="226080"/>
-            <a:ext cx="9070200" cy="945000"/>
+            <a:ext cx="9069480" cy="944280"/>
           </a:xfrm>
           <a:prstGeom prst="rect">
             <a:avLst/>
@@ -11458,8 +10282,8 @@
         </p:blipFill>
         <p:spPr>
           <a:xfrm>
-            <a:off x="0" y="1740960"/>
-            <a:ext cx="5097960" cy="3058200"/>
+            <a:off x="4896720" y="1749600"/>
+            <a:ext cx="5183640" cy="3110040"/>
           </a:xfrm>
           <a:prstGeom prst="rect">
             <a:avLst/>
@@ -11481,8 +10305,8 @@
         </p:blipFill>
         <p:spPr>
           <a:xfrm>
-            <a:off x="4745880" y="1648800"/>
-            <a:ext cx="5332680" cy="3198960"/>
+            <a:off x="1440" y="1757880"/>
+            <a:ext cx="5254200" cy="3152160"/>
           </a:xfrm>
           <a:prstGeom prst="rect">
             <a:avLst/>
@@ -11535,7 +10359,7 @@
         <p:spPr>
           <a:xfrm>
             <a:off x="504000" y="226080"/>
-            <a:ext cx="9070200" cy="945000"/>
+            <a:ext cx="9069480" cy="944280"/>
           </a:xfrm>
           <a:prstGeom prst="rect">
             <a:avLst/>
@@ -11587,7 +10411,7 @@
         <p:spPr>
           <a:xfrm>
             <a:off x="4800600" y="1508760"/>
-            <a:ext cx="5256360" cy="3152880"/>
+            <a:ext cx="5255640" cy="3152160"/>
           </a:xfrm>
           <a:prstGeom prst="rect">
             <a:avLst/>
@@ -11610,7 +10434,7 @@
         <p:spPr>
           <a:xfrm>
             <a:off x="5760" y="1558080"/>
-            <a:ext cx="5022000" cy="3012480"/>
+            <a:ext cx="5021280" cy="3011760"/>
           </a:xfrm>
           <a:prstGeom prst="rect">
             <a:avLst/>
@@ -11632,8 +10456,8 @@
         </p:blipFill>
         <p:spPr>
           <a:xfrm flipH="1">
-            <a:off x="8674560" y="35280"/>
-            <a:ext cx="1224720" cy="1224720"/>
+            <a:off x="8675280" y="35280"/>
+            <a:ext cx="1224000" cy="1224000"/>
           </a:xfrm>
           <a:prstGeom prst="rect">
             <a:avLst/>
@@ -11655,8 +10479,8 @@
         </p:blipFill>
         <p:spPr>
           <a:xfrm flipH="1">
-            <a:off x="142560" y="71280"/>
-            <a:ext cx="1224720" cy="1224720"/>
+            <a:off x="143280" y="71280"/>
+            <a:ext cx="1224000" cy="1224000"/>
           </a:xfrm>
           <a:prstGeom prst="rect">
             <a:avLst/>
@@ -11704,7 +10528,7 @@
         </p:nvGraphicFramePr>
         <p:xfrm>
           <a:off x="360000" y="1795680"/>
-          <a:ext cx="9308880" cy="2879640"/>
+          <a:ext cx="8987040" cy="2879640"/>
         </p:xfrm>
         <a:graphic>
           <a:graphicData uri="http://schemas.openxmlformats.org/drawingml/2006/table">
@@ -11750,11 +10574,14 @@
                 </a:tc>
                 <a:tc>
                   <a:txBody>
-                    <a:bodyPr lIns="90000" rIns="90000" tIns="46800" bIns="46800" anchor="ctr">
+                    <a:bodyPr lIns="90000" rIns="90000" anchor="ctr">
                       <a:noAutofit/>
                     </a:bodyPr>
                     <a:p>
                       <a:pPr algn="ctr">
+                        <a:lnSpc>
+                          <a:spcPct val="100000"/>
+                        </a:lnSpc>
                         <a:buNone/>
                       </a:pPr>
                       <a:r>
@@ -11796,7 +10623,7 @@
                 </a:tc>
                 <a:tc>
                   <a:txBody>
-                    <a:bodyPr lIns="90000" rIns="90000" tIns="46800" bIns="46800" anchor="ctr">
+                    <a:bodyPr lIns="90000" rIns="90000" anchor="ctr">
                       <a:noAutofit/>
                     </a:bodyPr>
                     <a:p>
@@ -11819,7 +10646,6 @@
                       </a:r>
                       <a:endParaRPr b="0" lang="en-AU" sz="1500" spc="-1" strike="noStrike">
                         <a:latin typeface="Arial"/>
-                        <a:ea typeface="Noto Sans Mono CJK JP"/>
                       </a:endParaRPr>
                     </a:p>
                   </a:txBody>
@@ -11851,11 +10677,14 @@
                 </a:tc>
                 <a:tc>
                   <a:txBody>
-                    <a:bodyPr lIns="90000" rIns="90000" tIns="46800" bIns="46800" anchor="ctr">
+                    <a:bodyPr lIns="90000" rIns="90000" anchor="ctr">
                       <a:noAutofit/>
                     </a:bodyPr>
                     <a:p>
                       <a:pPr algn="ctr">
+                        <a:lnSpc>
+                          <a:spcPct val="100000"/>
+                        </a:lnSpc>
                         <a:buNone/>
                       </a:pPr>
                       <a:r>
@@ -11871,6 +10700,9 @@
                     </a:p>
                     <a:p>
                       <a:pPr algn="ctr">
+                        <a:lnSpc>
+                          <a:spcPct val="100000"/>
+                        </a:lnSpc>
                         <a:buNone/>
                       </a:pPr>
                       <a:r>
@@ -11913,11 +10745,14 @@
                 </a:tc>
                 <a:tc>
                   <a:txBody>
-                    <a:bodyPr lIns="90000" rIns="90000" tIns="46800" bIns="46800" anchor="ctr">
+                    <a:bodyPr lIns="90000" rIns="90000" anchor="ctr">
                       <a:noAutofit/>
                     </a:bodyPr>
                     <a:p>
                       <a:pPr algn="ctr">
+                        <a:lnSpc>
+                          <a:spcPct val="100000"/>
+                        </a:lnSpc>
                         <a:buNone/>
                       </a:pPr>
                       <a:r>
@@ -11959,11 +10794,14 @@
                 </a:tc>
                 <a:tc>
                   <a:txBody>
-                    <a:bodyPr lIns="90000" rIns="90000" tIns="46800" bIns="46800" anchor="ctr">
+                    <a:bodyPr lIns="90000" rIns="90000" anchor="ctr">
                       <a:noAutofit/>
                     </a:bodyPr>
                     <a:p>
                       <a:pPr algn="ctr">
+                        <a:lnSpc>
+                          <a:spcPct val="100000"/>
+                        </a:lnSpc>
                         <a:buNone/>
                       </a:pPr>
                       <a:r>
@@ -12003,22 +10841,24 @@
                 </a:tc>
                 <a:tc>
                   <a:txBody>
-                    <a:bodyPr lIns="90000" rIns="90000" tIns="46800" bIns="46800" anchor="ctr">
+                    <a:bodyPr lIns="90000" rIns="90000" anchor="ctr">
                       <a:noAutofit/>
                     </a:bodyPr>
                     <a:p>
                       <a:pPr algn="ctr">
+                        <a:lnSpc>
+                          <a:spcPct val="100000"/>
+                        </a:lnSpc>
                         <a:buNone/>
                       </a:pPr>
                       <a:r>
                         <a:rPr b="0" lang="en-AU" sz="1500" spc="-1" strike="noStrike">
                           <a:latin typeface="Arial"/>
                         </a:rPr>
-                        <a:t>Gross Profit</a:t>
+                        <a:t>Gross Profit ($)</a:t>
                       </a:r>
                       <a:endParaRPr b="0" lang="en-AU" sz="1500" spc="-1" strike="noStrike">
                         <a:latin typeface="Arial"/>
-                        <a:ea typeface="Noto Sans Mono CJK JP"/>
                       </a:endParaRPr>
                     </a:p>
                   </a:txBody>
@@ -12048,11 +10888,14 @@
                 </a:tc>
                 <a:tc>
                   <a:txBody>
-                    <a:bodyPr lIns="90000" rIns="90000" tIns="46800" bIns="46800" anchor="ctr">
+                    <a:bodyPr lIns="90000" rIns="90000" anchor="ctr">
                       <a:noAutofit/>
                     </a:bodyPr>
                     <a:p>
                       <a:pPr marL="216000" indent="-216000" algn="ctr">
+                        <a:lnSpc>
+                          <a:spcPct val="100000"/>
+                        </a:lnSpc>
                         <a:buClr>
                           <a:srgbClr val="000000"/>
                         </a:buClr>
@@ -12064,11 +10907,10 @@
                         <a:rPr b="0" lang="en-AU" sz="1500" spc="-1" strike="noStrike">
                           <a:latin typeface="Arial"/>
                         </a:rPr>
-                        <a:t>Change</a:t>
+                        <a:t>Change ($)</a:t>
                       </a:r>
                       <a:endParaRPr b="0" lang="en-AU" sz="1500" spc="-1" strike="noStrike">
                         <a:latin typeface="Arial"/>
-                        <a:ea typeface="Noto Sans Mono CJK JP"/>
                       </a:endParaRPr>
                     </a:p>
                   </a:txBody>
@@ -12102,11 +10944,14 @@
               <a:tr h="719640">
                 <a:tc>
                   <a:txBody>
-                    <a:bodyPr lIns="90000" rIns="90000" tIns="46800" bIns="46800" anchor="ctr">
+                    <a:bodyPr lIns="90000" rIns="90000" anchor="ctr">
                       <a:noAutofit/>
                     </a:bodyPr>
                     <a:p>
                       <a:pPr algn="ctr">
+                        <a:lnSpc>
+                          <a:spcPct val="100000"/>
+                        </a:lnSpc>
                         <a:buNone/>
                       </a:pPr>
                       <a:r>
@@ -12148,11 +10993,14 @@
                 </a:tc>
                 <a:tc>
                   <a:txBody>
-                    <a:bodyPr lIns="90000" rIns="90000" tIns="46800" bIns="46800" anchor="ctr">
+                    <a:bodyPr lIns="90000" rIns="90000" anchor="ctr">
                       <a:noAutofit/>
                     </a:bodyPr>
                     <a:p>
                       <a:pPr algn="ctr">
+                        <a:lnSpc>
+                          <a:spcPct val="100000"/>
+                        </a:lnSpc>
                         <a:buNone/>
                       </a:pPr>
                       <a:r>
@@ -12194,7 +11042,7 @@
                 </a:tc>
                 <a:tc>
                   <a:txBody>
-                    <a:bodyPr lIns="90000" rIns="90000" tIns="46800" bIns="46800" anchor="ctr">
+                    <a:bodyPr lIns="90000" rIns="90000" anchor="ctr">
                       <a:noAutofit/>
                     </a:bodyPr>
                     <a:p>
@@ -12217,7 +11065,6 @@
                       </a:r>
                       <a:endParaRPr b="0" lang="en-AU" sz="1500" spc="-1" strike="noStrike">
                         <a:latin typeface="Arial"/>
-                        <a:ea typeface="Noto Sans Mono CJK JP"/>
                       </a:endParaRPr>
                     </a:p>
                   </a:txBody>
@@ -12249,11 +11096,14 @@
                 </a:tc>
                 <a:tc>
                   <a:txBody>
-                    <a:bodyPr lIns="90000" rIns="90000" tIns="46800" bIns="46800" anchor="ctr">
+                    <a:bodyPr lIns="90000" rIns="90000" anchor="ctr">
                       <a:noAutofit/>
                     </a:bodyPr>
                     <a:p>
                       <a:pPr algn="ctr">
+                        <a:lnSpc>
+                          <a:spcPct val="100000"/>
+                        </a:lnSpc>
                         <a:buNone/>
                       </a:pPr>
                       <a:r>
@@ -12295,18 +11145,21 @@
                 </a:tc>
                 <a:tc>
                   <a:txBody>
-                    <a:bodyPr lIns="90000" rIns="90000" tIns="46800" bIns="46800" anchor="ctr">
+                    <a:bodyPr lIns="90000" rIns="90000" anchor="ctr">
                       <a:noAutofit/>
                     </a:bodyPr>
                     <a:p>
                       <a:pPr algn="ctr">
+                        <a:lnSpc>
+                          <a:spcPct val="100000"/>
+                        </a:lnSpc>
                         <a:buNone/>
                       </a:pPr>
                       <a:r>
                         <a:rPr b="0" lang="en-AU" sz="1500" spc="-1" strike="noStrike">
                           <a:latin typeface="Arial"/>
                         </a:rPr>
-                        <a:t>4067.30</a:t>
+                        <a:t>4,067.30</a:t>
                       </a:r>
                       <a:endParaRPr b="0" lang="en-AU" sz="1500" spc="-1" strike="noStrike">
                         <a:latin typeface="Arial"/>
@@ -12319,7 +11172,7 @@
                         <a:srgbClr val="ffffff"/>
                       </a:solidFill>
                     </a:lnL>
-                    <a:lnR>
+                    <a:lnR w="720">
                       <a:noFill/>
                     </a:lnR>
                     <a:lnT w="720">
@@ -12339,11 +11192,14 @@
                 </a:tc>
                 <a:tc>
                   <a:txBody>
-                    <a:bodyPr lIns="90000" rIns="90000" tIns="46800" bIns="46800" anchor="ctr">
+                    <a:bodyPr lIns="90000" rIns="90000" anchor="ctr">
                       <a:noAutofit/>
                     </a:bodyPr>
                     <a:p>
                       <a:pPr algn="ctr">
+                        <a:lnSpc>
+                          <a:spcPct val="100000"/>
+                        </a:lnSpc>
                         <a:buNone/>
                       </a:pPr>
                       <a:r>
@@ -12354,7 +11210,6 @@
                       </a:r>
                       <a:endParaRPr b="0" lang="en-AU" sz="1500" spc="-1" strike="noStrike">
                         <a:latin typeface="Arial"/>
-                        <a:ea typeface="Noto Sans Mono CJK JP"/>
                       </a:endParaRPr>
                     </a:p>
                   </a:txBody>
@@ -12378,7 +11233,7 @@
                 </a:tc>
                 <a:tc>
                   <a:txBody>
-                    <a:bodyPr lIns="90000" rIns="90000" tIns="46800" bIns="46800" anchor="ctr">
+                    <a:bodyPr lIns="90000" rIns="90000" anchor="ctr">
                       <a:noAutofit/>
                     </a:bodyPr>
                     <a:p>
@@ -12397,11 +11252,10 @@
                         <a:rPr b="0" lang="en-AU" sz="1500" spc="-1" strike="noStrike">
                           <a:latin typeface="Arial"/>
                         </a:rPr>
-                        <a:t>1930.49</a:t>
+                        <a:t>1,930.49</a:t>
                       </a:r>
                       <a:endParaRPr b="0" lang="en-AU" sz="1500" spc="-1" strike="noStrike">
                         <a:latin typeface="Arial"/>
-                        <a:ea typeface="Noto Sans Mono CJK JP"/>
                       </a:endParaRPr>
                     </a:p>
                   </a:txBody>
@@ -12425,7 +11279,7 @@
                 </a:tc>
                 <a:tc>
                   <a:txBody>
-                    <a:bodyPr lIns="90000" rIns="90000" tIns="46800" bIns="46800" anchor="ctr">
+                    <a:bodyPr lIns="90000" rIns="90000" anchor="ctr">
                       <a:noAutofit/>
                     </a:bodyPr>
                     <a:p>
@@ -12448,7 +11302,6 @@
                       </a:r>
                       <a:endParaRPr b="0" lang="en-AU" sz="1500" spc="-1" strike="noStrike">
                         <a:latin typeface="Arial"/>
-                        <a:ea typeface="Noto Sans Mono CJK JP"/>
                       </a:endParaRPr>
                     </a:p>
                   </a:txBody>
@@ -12480,11 +11333,14 @@
               <a:tr h="720360">
                 <a:tc>
                   <a:txBody>
-                    <a:bodyPr lIns="90000" rIns="90000" tIns="46800" bIns="46800" anchor="ctr">
+                    <a:bodyPr lIns="90000" rIns="90000" anchor="ctr">
                       <a:noAutofit/>
                     </a:bodyPr>
                     <a:p>
                       <a:pPr algn="ctr">
+                        <a:lnSpc>
+                          <a:spcPct val="100000"/>
+                        </a:lnSpc>
                         <a:buNone/>
                       </a:pPr>
                       <a:r>
@@ -12526,11 +11382,14 @@
                 </a:tc>
                 <a:tc>
                   <a:txBody>
-                    <a:bodyPr lIns="90000" rIns="90000" tIns="46800" bIns="46800" anchor="ctr">
+                    <a:bodyPr lIns="90000" rIns="90000" anchor="ctr">
                       <a:noAutofit/>
                     </a:bodyPr>
                     <a:p>
                       <a:pPr algn="ctr">
+                        <a:lnSpc>
+                          <a:spcPct val="100000"/>
+                        </a:lnSpc>
                         <a:buNone/>
                       </a:pPr>
                       <a:r>
@@ -12572,7 +11431,7 @@
                 </a:tc>
                 <a:tc>
                   <a:txBody>
-                    <a:bodyPr lIns="90000" rIns="90000" tIns="46800" bIns="46800" anchor="ctr">
+                    <a:bodyPr lIns="90000" rIns="90000" anchor="ctr">
                       <a:noAutofit/>
                     </a:bodyPr>
                     <a:p>
@@ -12595,7 +11454,6 @@
                       </a:r>
                       <a:endParaRPr b="0" lang="en-AU" sz="1500" spc="-1" strike="noStrike">
                         <a:latin typeface="Arial"/>
-                        <a:ea typeface="Noto Sans Mono CJK JP"/>
                       </a:endParaRPr>
                     </a:p>
                   </a:txBody>
@@ -12627,11 +11485,14 @@
                 </a:tc>
                 <a:tc>
                   <a:txBody>
-                    <a:bodyPr lIns="90000" rIns="90000" tIns="46800" bIns="46800" anchor="ctr">
+                    <a:bodyPr lIns="90000" rIns="90000" anchor="ctr">
                       <a:noAutofit/>
                     </a:bodyPr>
                     <a:p>
                       <a:pPr algn="ctr">
+                        <a:lnSpc>
+                          <a:spcPct val="100000"/>
+                        </a:lnSpc>
                         <a:buNone/>
                       </a:pPr>
                       <a:r>
@@ -12673,18 +11534,21 @@
                 </a:tc>
                 <a:tc>
                   <a:txBody>
-                    <a:bodyPr lIns="90000" rIns="90000" tIns="46800" bIns="46800" anchor="ctr">
+                    <a:bodyPr lIns="90000" rIns="90000" anchor="ctr">
                       <a:noAutofit/>
                     </a:bodyPr>
                     <a:p>
                       <a:pPr algn="ctr">
+                        <a:lnSpc>
+                          <a:spcPct val="100000"/>
+                        </a:lnSpc>
                         <a:buNone/>
                       </a:pPr>
                       <a:r>
                         <a:rPr b="0" lang="en-AU" sz="1500" spc="-1" strike="noStrike">
                           <a:latin typeface="Arial"/>
                         </a:rPr>
-                        <a:t>4332.45</a:t>
+                        <a:t>4,332.45</a:t>
                       </a:r>
                       <a:endParaRPr b="0" lang="en-AU" sz="1500" spc="-1" strike="noStrike">
                         <a:latin typeface="Arial"/>
@@ -12719,11 +11583,14 @@
                 </a:tc>
                 <a:tc>
                   <a:txBody>
-                    <a:bodyPr lIns="90000" rIns="90000" tIns="46800" bIns="46800" anchor="ctr">
+                    <a:bodyPr lIns="90000" rIns="90000" anchor="ctr">
                       <a:noAutofit/>
                     </a:bodyPr>
                     <a:p>
                       <a:pPr algn="ctr">
+                        <a:lnSpc>
+                          <a:spcPct val="100000"/>
+                        </a:lnSpc>
                         <a:buNone/>
                       </a:pPr>
                       <a:r>
@@ -12763,7 +11630,7 @@
                 </a:tc>
                 <a:tc>
                   <a:txBody>
-                    <a:bodyPr lIns="90000" rIns="90000" tIns="46800" bIns="46800" anchor="ctr">
+                    <a:bodyPr lIns="90000" rIns="90000" anchor="ctr">
                       <a:noAutofit/>
                     </a:bodyPr>
                     <a:p>
@@ -12782,11 +11649,10 @@
                         <a:rPr b="0" lang="en-AU" sz="1500" spc="-1" strike="noStrike">
                           <a:latin typeface="Arial"/>
                         </a:rPr>
-                        <a:t>2300.10</a:t>
+                        <a:t>2,300.10</a:t>
                       </a:r>
                       <a:endParaRPr b="0" lang="en-AU" sz="1500" spc="-1" strike="noStrike">
                         <a:latin typeface="Arial"/>
-                        <a:ea typeface="Noto Sans Mono CJK JP"/>
                       </a:endParaRPr>
                     </a:p>
                   </a:txBody>
@@ -12816,7 +11682,7 @@
                 </a:tc>
                 <a:tc>
                   <a:txBody>
-                    <a:bodyPr lIns="90000" rIns="90000" tIns="46800" bIns="46800" anchor="ctr">
+                    <a:bodyPr lIns="90000" rIns="90000" anchor="ctr">
                       <a:noAutofit/>
                     </a:bodyPr>
                     <a:p>
@@ -12839,7 +11705,6 @@
                       </a:r>
                       <a:endParaRPr b="0" lang="en-AU" sz="1500" spc="-1" strike="noStrike">
                         <a:latin typeface="Arial"/>
-                        <a:ea typeface="Noto Sans Mono CJK JP"/>
                       </a:endParaRPr>
                     </a:p>
                   </a:txBody>
@@ -12873,11 +11738,14 @@
               <a:tr h="720360">
                 <a:tc>
                   <a:txBody>
-                    <a:bodyPr lIns="90000" rIns="90000" tIns="46800" bIns="46800" anchor="ctr">
+                    <a:bodyPr lIns="90000" rIns="90000" anchor="ctr">
                       <a:noAutofit/>
                     </a:bodyPr>
                     <a:p>
                       <a:pPr algn="ctr">
+                        <a:lnSpc>
+                          <a:spcPct val="100000"/>
+                        </a:lnSpc>
                         <a:buNone/>
                       </a:pPr>
                       <a:r>
@@ -12919,11 +11787,14 @@
                 </a:tc>
                 <a:tc>
                   <a:txBody>
-                    <a:bodyPr lIns="90000" rIns="90000" tIns="46800" bIns="46800" anchor="ctr">
+                    <a:bodyPr lIns="90000" rIns="90000" anchor="ctr">
                       <a:noAutofit/>
                     </a:bodyPr>
                     <a:p>
                       <a:pPr algn="ctr">
+                        <a:lnSpc>
+                          <a:spcPct val="100000"/>
+                        </a:lnSpc>
                         <a:buNone/>
                       </a:pPr>
                       <a:r>
@@ -13019,11 +11890,14 @@
                 </a:tc>
                 <a:tc>
                   <a:txBody>
-                    <a:bodyPr lIns="90000" rIns="90000" tIns="46800" bIns="46800" anchor="ctr">
+                    <a:bodyPr lIns="90000" rIns="90000" anchor="ctr">
                       <a:noAutofit/>
                     </a:bodyPr>
                     <a:p>
                       <a:pPr algn="ctr">
+                        <a:lnSpc>
+                          <a:spcPct val="100000"/>
+                        </a:lnSpc>
                         <a:buNone/>
                       </a:pPr>
                       <a:r>
@@ -13065,11 +11939,14 @@
                 </a:tc>
                 <a:tc>
                   <a:txBody>
-                    <a:bodyPr lIns="90000" rIns="90000" tIns="46800" bIns="46800" anchor="ctr">
+                    <a:bodyPr lIns="90000" rIns="90000" anchor="ctr">
                       <a:noAutofit/>
                     </a:bodyPr>
                     <a:p>
                       <a:pPr algn="ctr">
+                        <a:lnSpc>
+                          <a:spcPct val="100000"/>
+                        </a:lnSpc>
                         <a:buNone/>
                       </a:pPr>
                       <a:r>
@@ -13111,11 +11988,14 @@
                 </a:tc>
                 <a:tc>
                   <a:txBody>
-                    <a:bodyPr lIns="90000" rIns="90000" tIns="46800" bIns="46800" anchor="ctr">
+                    <a:bodyPr lIns="90000" rIns="90000" anchor="ctr">
                       <a:noAutofit/>
                     </a:bodyPr>
                     <a:p>
                       <a:pPr algn="ctr">
+                        <a:lnSpc>
+                          <a:spcPct val="100000"/>
+                        </a:lnSpc>
                         <a:buNone/>
                       </a:pPr>
                       <a:r>
@@ -13157,7 +12037,7 @@
                 </a:tc>
                 <a:tc>
                   <a:txBody>
-                    <a:bodyPr lIns="90000" rIns="90000" tIns="46800" bIns="46800" anchor="ctr">
+                    <a:bodyPr lIns="90000" rIns="90000" anchor="ctr">
                       <a:noAutofit/>
                     </a:bodyPr>
                     <a:p>
@@ -13175,7 +12055,6 @@
                       </a:r>
                       <a:endParaRPr b="0" lang="en-AU" sz="1500" spc="-1" strike="noStrike">
                         <a:latin typeface="Arial"/>
-                        <a:ea typeface="Noto Sans Mono CJK JP"/>
                       </a:endParaRPr>
                     </a:p>
                   </a:txBody>
@@ -13213,13 +12092,13 @@
       <p:sp>
         <p:nvSpPr>
           <p:cNvPr id="110" name="PlaceHolder 3"/>
-          <p:cNvSpPr txBox="1"/>
+          <p:cNvSpPr/>
           <p:nvPr/>
         </p:nvSpPr>
         <p:spPr>
           <a:xfrm>
             <a:off x="504360" y="226440"/>
-            <a:ext cx="9070200" cy="945000"/>
+            <a:ext cx="9069480" cy="944280"/>
           </a:xfrm>
           <a:prstGeom prst="rect">
             <a:avLst/>
@@ -13229,6 +12108,12 @@
             <a:noFill/>
           </a:ln>
         </p:spPr>
+        <p:style>
+          <a:lnRef idx="0"/>
+          <a:fillRef idx="0"/>
+          <a:effectRef idx="0"/>
+          <a:fontRef idx="minor"/>
+        </p:style>
         <p:txBody>
           <a:bodyPr lIns="0" rIns="0" tIns="0" bIns="0" anchor="ctr">
             <a:noAutofit/>
@@ -13249,6 +12134,7 @@
                   <a:srgbClr val="000000"/>
                 </a:solidFill>
                 <a:latin typeface="Arial"/>
+                <a:ea typeface="DejaVu Sans"/>
               </a:rPr>
               <a:t>Recommendations</a:t>
             </a:r>

</xml_diff>